<commit_message>
Ensure new csv not appended to older in cube simu wkw + Minor fix in finance doc
</commit_message>
<xml_diff>
--- a/Finance/resources/doc/dev/risk-valuation-proactive.pptx
+++ b/Finance/resources/doc/dev/risk-valuation-proactive.pptx
@@ -374,10 +374,10 @@
                 <a:solidFill>
                   <a:srgbClr val="000000"/>
                 </a:solidFill>
-                <a:latin typeface="Avenir"/>
-                <a:ea typeface="Avenir"/>
-                <a:cs typeface="Avenir"/>
-                <a:sym typeface="Avenir"/>
+                <a:latin typeface="Arial"/>
+                <a:ea typeface="Arial"/>
+                <a:cs typeface="Arial"/>
+                <a:sym typeface="Arial"/>
               </a:defRPr>
             </a:lvl1pPr>
             <a:lvl2pPr indent="-228600" lvl="1" marL="914400" marR="0" rtl="0" algn="l">
@@ -400,10 +400,10 @@
                 <a:solidFill>
                   <a:srgbClr val="000000"/>
                 </a:solidFill>
-                <a:latin typeface="Avenir"/>
-                <a:ea typeface="Avenir"/>
-                <a:cs typeface="Avenir"/>
-                <a:sym typeface="Avenir"/>
+                <a:latin typeface="Arial"/>
+                <a:ea typeface="Arial"/>
+                <a:cs typeface="Arial"/>
+                <a:sym typeface="Arial"/>
               </a:defRPr>
             </a:lvl2pPr>
             <a:lvl3pPr indent="-228600" lvl="2" marL="1371600" marR="0" rtl="0" algn="l">
@@ -426,10 +426,10 @@
                 <a:solidFill>
                   <a:srgbClr val="000000"/>
                 </a:solidFill>
-                <a:latin typeface="Avenir"/>
-                <a:ea typeface="Avenir"/>
-                <a:cs typeface="Avenir"/>
-                <a:sym typeface="Avenir"/>
+                <a:latin typeface="Arial"/>
+                <a:ea typeface="Arial"/>
+                <a:cs typeface="Arial"/>
+                <a:sym typeface="Arial"/>
               </a:defRPr>
             </a:lvl3pPr>
             <a:lvl4pPr indent="-228600" lvl="3" marL="1828800" marR="0" rtl="0" algn="l">
@@ -452,10 +452,10 @@
                 <a:solidFill>
                   <a:srgbClr val="000000"/>
                 </a:solidFill>
-                <a:latin typeface="Avenir"/>
-                <a:ea typeface="Avenir"/>
-                <a:cs typeface="Avenir"/>
-                <a:sym typeface="Avenir"/>
+                <a:latin typeface="Arial"/>
+                <a:ea typeface="Arial"/>
+                <a:cs typeface="Arial"/>
+                <a:sym typeface="Arial"/>
               </a:defRPr>
             </a:lvl4pPr>
             <a:lvl5pPr indent="-228600" lvl="4" marL="2286000" marR="0" rtl="0" algn="l">
@@ -478,10 +478,10 @@
                 <a:solidFill>
                   <a:srgbClr val="000000"/>
                 </a:solidFill>
-                <a:latin typeface="Avenir"/>
-                <a:ea typeface="Avenir"/>
-                <a:cs typeface="Avenir"/>
-                <a:sym typeface="Avenir"/>
+                <a:latin typeface="Arial"/>
+                <a:ea typeface="Arial"/>
+                <a:cs typeface="Arial"/>
+                <a:sym typeface="Arial"/>
               </a:defRPr>
             </a:lvl5pPr>
             <a:lvl6pPr indent="-228600" lvl="5" marL="2743200" marR="0" rtl="0" algn="l">
@@ -504,10 +504,10 @@
                 <a:solidFill>
                   <a:srgbClr val="000000"/>
                 </a:solidFill>
-                <a:latin typeface="Avenir"/>
-                <a:ea typeface="Avenir"/>
-                <a:cs typeface="Avenir"/>
-                <a:sym typeface="Avenir"/>
+                <a:latin typeface="Arial"/>
+                <a:ea typeface="Arial"/>
+                <a:cs typeface="Arial"/>
+                <a:sym typeface="Arial"/>
               </a:defRPr>
             </a:lvl6pPr>
             <a:lvl7pPr indent="-228600" lvl="6" marL="3200400" marR="0" rtl="0" algn="l">
@@ -530,10 +530,10 @@
                 <a:solidFill>
                   <a:srgbClr val="000000"/>
                 </a:solidFill>
-                <a:latin typeface="Avenir"/>
-                <a:ea typeface="Avenir"/>
-                <a:cs typeface="Avenir"/>
-                <a:sym typeface="Avenir"/>
+                <a:latin typeface="Arial"/>
+                <a:ea typeface="Arial"/>
+                <a:cs typeface="Arial"/>
+                <a:sym typeface="Arial"/>
               </a:defRPr>
             </a:lvl7pPr>
             <a:lvl8pPr indent="-228600" lvl="7" marL="3657600" marR="0" rtl="0" algn="l">
@@ -556,10 +556,10 @@
                 <a:solidFill>
                   <a:srgbClr val="000000"/>
                 </a:solidFill>
-                <a:latin typeface="Avenir"/>
-                <a:ea typeface="Avenir"/>
-                <a:cs typeface="Avenir"/>
-                <a:sym typeface="Avenir"/>
+                <a:latin typeface="Arial"/>
+                <a:ea typeface="Arial"/>
+                <a:cs typeface="Arial"/>
+                <a:sym typeface="Arial"/>
               </a:defRPr>
             </a:lvl8pPr>
             <a:lvl9pPr indent="-228600" lvl="8" marL="4114800" marR="0" rtl="0" algn="l">
@@ -582,10 +582,10 @@
                 <a:solidFill>
                   <a:srgbClr val="000000"/>
                 </a:solidFill>
-                <a:latin typeface="Avenir"/>
-                <a:ea typeface="Avenir"/>
-                <a:cs typeface="Avenir"/>
-                <a:sym typeface="Avenir"/>
+                <a:latin typeface="Arial"/>
+                <a:ea typeface="Arial"/>
+                <a:cs typeface="Arial"/>
+                <a:sym typeface="Arial"/>
               </a:defRPr>
             </a:lvl9pPr>
           </a:lstStyle>
@@ -3158,10 +3158,10 @@
                 <a:solidFill>
                   <a:schemeClr val="lt1"/>
                 </a:solidFill>
-                <a:latin typeface="Calibri"/>
-                <a:ea typeface="Calibri"/>
-                <a:cs typeface="Calibri"/>
-                <a:sym typeface="Calibri"/>
+                <a:latin typeface="Arial"/>
+                <a:ea typeface="Arial"/>
+                <a:cs typeface="Arial"/>
+                <a:sym typeface="Arial"/>
               </a:rPr>
               <a:t>‹#›</a:t>
             </a:fld>
@@ -3169,10 +3169,10 @@
               <a:solidFill>
                 <a:schemeClr val="lt1"/>
               </a:solidFill>
-              <a:latin typeface="Calibri"/>
-              <a:ea typeface="Calibri"/>
-              <a:cs typeface="Calibri"/>
-              <a:sym typeface="Calibri"/>
+              <a:latin typeface="Arial"/>
+              <a:ea typeface="Arial"/>
+              <a:cs typeface="Arial"/>
+              <a:sym typeface="Arial"/>
             </a:endParaRPr>
           </a:p>
         </p:txBody>
@@ -11085,7 +11085,7 @@
           <a:effectLst>
             <a:outerShdw blurRad="57150" rotWithShape="0" algn="bl" dir="5400000" dist="19050">
               <a:srgbClr val="000000">
-                <a:alpha val="49803"/>
+                <a:alpha val="49411"/>
               </a:srgbClr>
             </a:outerShdw>
           </a:effectLst>
@@ -11159,7 +11159,7 @@
           <a:effectLst>
             <a:outerShdw blurRad="57150" rotWithShape="0" algn="bl" dir="5400000" dist="19050">
               <a:srgbClr val="000000">
-                <a:alpha val="49803"/>
+                <a:alpha val="49411"/>
               </a:srgbClr>
             </a:outerShdw>
           </a:effectLst>
@@ -11233,7 +11233,7 @@
           <a:effectLst>
             <a:outerShdw blurRad="57150" rotWithShape="0" algn="bl" dir="5400000" dist="19050">
               <a:srgbClr val="000000">
-                <a:alpha val="49803"/>
+                <a:alpha val="49411"/>
               </a:srgbClr>
             </a:outerShdw>
           </a:effectLst>
@@ -11307,7 +11307,7 @@
           <a:effectLst>
             <a:outerShdw blurRad="57150" rotWithShape="0" algn="bl" dir="5400000" dist="19050">
               <a:srgbClr val="000000">
-                <a:alpha val="49803"/>
+                <a:alpha val="49411"/>
               </a:srgbClr>
             </a:outerShdw>
           </a:effectLst>
@@ -11381,7 +11381,7 @@
           <a:effectLst>
             <a:outerShdw blurRad="57150" rotWithShape="0" algn="bl" dir="5400000" dist="19050">
               <a:srgbClr val="000000">
-                <a:alpha val="49803"/>
+                <a:alpha val="49411"/>
               </a:srgbClr>
             </a:outerShdw>
           </a:effectLst>
@@ -11455,7 +11455,7 @@
           <a:effectLst>
             <a:outerShdw blurRad="57150" rotWithShape="0" algn="bl" dir="5400000" dist="19050">
               <a:srgbClr val="000000">
-                <a:alpha val="49803"/>
+                <a:alpha val="49411"/>
               </a:srgbClr>
             </a:outerShdw>
           </a:effectLst>
@@ -11529,7 +11529,7 @@
           <a:effectLst>
             <a:outerShdw blurRad="57150" rotWithShape="0" algn="bl" dir="5400000" dist="19050">
               <a:srgbClr val="000000">
-                <a:alpha val="49803"/>
+                <a:alpha val="49411"/>
               </a:srgbClr>
             </a:outerShdw>
           </a:effectLst>
@@ -11603,7 +11603,7 @@
           <a:effectLst>
             <a:outerShdw blurRad="57150" rotWithShape="0" algn="bl" dir="5400000" dist="19050">
               <a:srgbClr val="000000">
-                <a:alpha val="49803"/>
+                <a:alpha val="49411"/>
               </a:srgbClr>
             </a:outerShdw>
           </a:effectLst>
@@ -11677,7 +11677,7 @@
           <a:effectLst>
             <a:outerShdw blurRad="57150" rotWithShape="0" algn="bl" dir="5400000" dist="19050">
               <a:srgbClr val="000000">
-                <a:alpha val="49803"/>
+                <a:alpha val="49411"/>
               </a:srgbClr>
             </a:outerShdw>
           </a:effectLst>
@@ -11751,7 +11751,7 @@
           <a:effectLst>
             <a:outerShdw blurRad="57150" rotWithShape="0" algn="bl" dir="5400000" dist="19050">
               <a:srgbClr val="000000">
-                <a:alpha val="49803"/>
+                <a:alpha val="49411"/>
               </a:srgbClr>
             </a:outerShdw>
           </a:effectLst>
@@ -11825,7 +11825,7 @@
           <a:effectLst>
             <a:outerShdw blurRad="57150" rotWithShape="0" algn="bl" dir="5400000" dist="19050">
               <a:srgbClr val="000000">
-                <a:alpha val="49803"/>
+                <a:alpha val="49411"/>
               </a:srgbClr>
             </a:outerShdw>
           </a:effectLst>
@@ -11899,7 +11899,7 @@
           <a:effectLst>
             <a:outerShdw blurRad="57150" rotWithShape="0" algn="bl" dir="5400000" dist="19050">
               <a:srgbClr val="000000">
-                <a:alpha val="49803"/>
+                <a:alpha val="49411"/>
               </a:srgbClr>
             </a:outerShdw>
           </a:effectLst>
@@ -11973,7 +11973,7 @@
           <a:effectLst>
             <a:outerShdw blurRad="57150" rotWithShape="0" algn="bl" dir="5400000" dist="19050">
               <a:srgbClr val="000000">
-                <a:alpha val="49803"/>
+                <a:alpha val="49411"/>
               </a:srgbClr>
             </a:outerShdw>
           </a:effectLst>
@@ -12047,7 +12047,7 @@
           <a:effectLst>
             <a:outerShdw blurRad="57150" rotWithShape="0" algn="bl" dir="5400000" dist="19050">
               <a:srgbClr val="000000">
-                <a:alpha val="49803"/>
+                <a:alpha val="49411"/>
               </a:srgbClr>
             </a:outerShdw>
           </a:effectLst>
@@ -12121,7 +12121,7 @@
           <a:effectLst>
             <a:outerShdw blurRad="57150" rotWithShape="0" algn="bl" dir="5400000" dist="19050">
               <a:srgbClr val="000000">
-                <a:alpha val="49803"/>
+                <a:alpha val="49411"/>
               </a:srgbClr>
             </a:outerShdw>
           </a:effectLst>
@@ -12195,7 +12195,7 @@
           <a:effectLst>
             <a:outerShdw blurRad="57150" rotWithShape="0" algn="bl" dir="5400000" dist="19050">
               <a:srgbClr val="000000">
-                <a:alpha val="49803"/>
+                <a:alpha val="49411"/>
               </a:srgbClr>
             </a:outerShdw>
           </a:effectLst>
@@ -12269,7 +12269,7 @@
           <a:effectLst>
             <a:outerShdw blurRad="57150" rotWithShape="0" algn="bl" dir="5400000" dist="19050">
               <a:srgbClr val="000000">
-                <a:alpha val="49803"/>
+                <a:alpha val="49411"/>
               </a:srgbClr>
             </a:outerShdw>
           </a:effectLst>
@@ -12343,7 +12343,7 @@
           <a:effectLst>
             <a:outerShdw blurRad="57150" rotWithShape="0" algn="bl" dir="5400000" dist="19050">
               <a:srgbClr val="000000">
-                <a:alpha val="49803"/>
+                <a:alpha val="49411"/>
               </a:srgbClr>
             </a:outerShdw>
           </a:effectLst>
@@ -12417,7 +12417,7 @@
           <a:effectLst>
             <a:outerShdw blurRad="57150" rotWithShape="0" algn="bl" dir="5400000" dist="19050">
               <a:srgbClr val="000000">
-                <a:alpha val="49803"/>
+                <a:alpha val="49411"/>
               </a:srgbClr>
             </a:outerShdw>
           </a:effectLst>
@@ -12491,7 +12491,7 @@
           <a:effectLst>
             <a:outerShdw blurRad="57150" rotWithShape="0" algn="bl" dir="5400000" dist="19050">
               <a:srgbClr val="000000">
-                <a:alpha val="49803"/>
+                <a:alpha val="49411"/>
               </a:srgbClr>
             </a:outerShdw>
           </a:effectLst>
@@ -12565,7 +12565,7 @@
           <a:effectLst>
             <a:outerShdw blurRad="57150" rotWithShape="0" algn="bl" dir="5400000" dist="19050">
               <a:srgbClr val="000000">
-                <a:alpha val="49803"/>
+                <a:alpha val="49411"/>
               </a:srgbClr>
             </a:outerShdw>
           </a:effectLst>
@@ -12639,7 +12639,7 @@
           <a:effectLst>
             <a:outerShdw blurRad="57150" rotWithShape="0" algn="bl" dir="5400000" dist="19050">
               <a:srgbClr val="000000">
-                <a:alpha val="49803"/>
+                <a:alpha val="49411"/>
               </a:srgbClr>
             </a:outerShdw>
           </a:effectLst>
@@ -12713,7 +12713,7 @@
           <a:effectLst>
             <a:outerShdw blurRad="57150" rotWithShape="0" algn="bl" dir="5400000" dist="19050">
               <a:srgbClr val="000000">
-                <a:alpha val="49803"/>
+                <a:alpha val="49411"/>
               </a:srgbClr>
             </a:outerShdw>
           </a:effectLst>
@@ -12787,7 +12787,7 @@
           <a:effectLst>
             <a:outerShdw blurRad="57150" rotWithShape="0" algn="bl" dir="5400000" dist="19050">
               <a:srgbClr val="000000">
-                <a:alpha val="49803"/>
+                <a:alpha val="49411"/>
               </a:srgbClr>
             </a:outerShdw>
           </a:effectLst>
@@ -12861,7 +12861,7 @@
           <a:effectLst>
             <a:outerShdw blurRad="57150" rotWithShape="0" algn="bl" dir="5400000" dist="19050">
               <a:srgbClr val="000000">
-                <a:alpha val="49803"/>
+                <a:alpha val="49411"/>
               </a:srgbClr>
             </a:outerShdw>
           </a:effectLst>
@@ -12935,7 +12935,7 @@
           <a:effectLst>
             <a:outerShdw blurRad="57150" rotWithShape="0" algn="bl" dir="5400000" dist="19050">
               <a:srgbClr val="000000">
-                <a:alpha val="49803"/>
+                <a:alpha val="49411"/>
               </a:srgbClr>
             </a:outerShdw>
           </a:effectLst>
@@ -13009,7 +13009,7 @@
           <a:effectLst>
             <a:outerShdw blurRad="57150" rotWithShape="0" algn="bl" dir="5400000" dist="19050">
               <a:srgbClr val="000000">
-                <a:alpha val="49803"/>
+                <a:alpha val="49411"/>
               </a:srgbClr>
             </a:outerShdw>
           </a:effectLst>
@@ -13083,7 +13083,7 @@
           <a:effectLst>
             <a:outerShdw blurRad="57150" rotWithShape="0" algn="bl" dir="5400000" dist="19050">
               <a:srgbClr val="000000">
-                <a:alpha val="49803"/>
+                <a:alpha val="49411"/>
               </a:srgbClr>
             </a:outerShdw>
           </a:effectLst>
@@ -13157,7 +13157,7 @@
           <a:effectLst>
             <a:outerShdw blurRad="57150" rotWithShape="0" algn="bl" dir="5400000" dist="19050">
               <a:srgbClr val="000000">
-                <a:alpha val="49803"/>
+                <a:alpha val="49411"/>
               </a:srgbClr>
             </a:outerShdw>
           </a:effectLst>
@@ -13231,7 +13231,7 @@
           <a:effectLst>
             <a:outerShdw blurRad="57150" rotWithShape="0" algn="bl" dir="5400000" dist="19050">
               <a:srgbClr val="000000">
-                <a:alpha val="49803"/>
+                <a:alpha val="49411"/>
               </a:srgbClr>
             </a:outerShdw>
           </a:effectLst>
@@ -13305,7 +13305,7 @@
           <a:effectLst>
             <a:outerShdw blurRad="57150" rotWithShape="0" algn="bl" dir="5400000" dist="19050">
               <a:srgbClr val="000000">
-                <a:alpha val="49803"/>
+                <a:alpha val="49411"/>
               </a:srgbClr>
             </a:outerShdw>
           </a:effectLst>
@@ -13379,7 +13379,7 @@
           <a:effectLst>
             <a:outerShdw blurRad="57150" rotWithShape="0" algn="bl" dir="5400000" dist="19050">
               <a:srgbClr val="000000">
-                <a:alpha val="49803"/>
+                <a:alpha val="49411"/>
               </a:srgbClr>
             </a:outerShdw>
           </a:effectLst>
@@ -13453,7 +13453,7 @@
           <a:effectLst>
             <a:outerShdw blurRad="57150" rotWithShape="0" algn="bl" dir="5400000" dist="19050">
               <a:srgbClr val="000000">
-                <a:alpha val="49803"/>
+                <a:alpha val="49411"/>
               </a:srgbClr>
             </a:outerShdw>
           </a:effectLst>
@@ -13527,7 +13527,7 @@
           <a:effectLst>
             <a:outerShdw blurRad="57150" rotWithShape="0" algn="bl" dir="5400000" dist="19050">
               <a:srgbClr val="000000">
-                <a:alpha val="49803"/>
+                <a:alpha val="49411"/>
               </a:srgbClr>
             </a:outerShdw>
           </a:effectLst>
@@ -13601,7 +13601,7 @@
           <a:effectLst>
             <a:outerShdw blurRad="57150" rotWithShape="0" algn="bl" dir="5400000" dist="19050">
               <a:srgbClr val="000000">
-                <a:alpha val="49803"/>
+                <a:alpha val="49411"/>
               </a:srgbClr>
             </a:outerShdw>
           </a:effectLst>
@@ -13675,7 +13675,7 @@
           <a:effectLst>
             <a:outerShdw blurRad="57150" rotWithShape="0" algn="bl" dir="5400000" dist="19050">
               <a:srgbClr val="000000">
-                <a:alpha val="49803"/>
+                <a:alpha val="49411"/>
               </a:srgbClr>
             </a:outerShdw>
           </a:effectLst>
@@ -13749,7 +13749,7 @@
           <a:effectLst>
             <a:outerShdw blurRad="57150" rotWithShape="0" algn="bl" dir="5400000" dist="19050">
               <a:srgbClr val="000000">
-                <a:alpha val="49803"/>
+                <a:alpha val="49411"/>
               </a:srgbClr>
             </a:outerShdw>
           </a:effectLst>
@@ -13823,7 +13823,7 @@
           <a:effectLst>
             <a:outerShdw blurRad="57150" rotWithShape="0" algn="bl" dir="5400000" dist="19050">
               <a:srgbClr val="000000">
-                <a:alpha val="49803"/>
+                <a:alpha val="49411"/>
               </a:srgbClr>
             </a:outerShdw>
           </a:effectLst>
@@ -13897,7 +13897,7 @@
           <a:effectLst>
             <a:outerShdw blurRad="57150" rotWithShape="0" algn="bl" dir="5400000" dist="19050">
               <a:srgbClr val="000000">
-                <a:alpha val="49803"/>
+                <a:alpha val="49411"/>
               </a:srgbClr>
             </a:outerShdw>
           </a:effectLst>
@@ -13971,7 +13971,7 @@
           <a:effectLst>
             <a:outerShdw blurRad="57150" rotWithShape="0" algn="bl" dir="5400000" dist="19050">
               <a:srgbClr val="000000">
-                <a:alpha val="49803"/>
+                <a:alpha val="49411"/>
               </a:srgbClr>
             </a:outerShdw>
           </a:effectLst>
@@ -14045,7 +14045,7 @@
           <a:effectLst>
             <a:outerShdw blurRad="57150" rotWithShape="0" algn="bl" dir="5400000" dist="19050">
               <a:srgbClr val="000000">
-                <a:alpha val="49803"/>
+                <a:alpha val="49411"/>
               </a:srgbClr>
             </a:outerShdw>
           </a:effectLst>
@@ -14119,7 +14119,7 @@
           <a:effectLst>
             <a:outerShdw blurRad="57150" rotWithShape="0" algn="bl" dir="5400000" dist="19050">
               <a:srgbClr val="000000">
-                <a:alpha val="49803"/>
+                <a:alpha val="49411"/>
               </a:srgbClr>
             </a:outerShdw>
           </a:effectLst>
@@ -14193,7 +14193,7 @@
           <a:effectLst>
             <a:outerShdw blurRad="57150" rotWithShape="0" algn="bl" dir="5400000" dist="19050">
               <a:srgbClr val="000000">
-                <a:alpha val="49803"/>
+                <a:alpha val="49411"/>
               </a:srgbClr>
             </a:outerShdw>
           </a:effectLst>
@@ -14267,7 +14267,7 @@
           <a:effectLst>
             <a:outerShdw blurRad="57150" rotWithShape="0" algn="bl" dir="5400000" dist="19050">
               <a:srgbClr val="000000">
-                <a:alpha val="49803"/>
+                <a:alpha val="49411"/>
               </a:srgbClr>
             </a:outerShdw>
           </a:effectLst>
@@ -14797,7 +14797,7 @@
           <a:effectLst>
             <a:outerShdw blurRad="57150" rotWithShape="0" algn="bl" dir="5400000" dist="19050">
               <a:srgbClr val="000000">
-                <a:alpha val="49803"/>
+                <a:alpha val="49411"/>
               </a:srgbClr>
             </a:outerShdw>
           </a:effectLst>
@@ -14871,7 +14871,7 @@
           <a:effectLst>
             <a:outerShdw blurRad="57150" rotWithShape="0" algn="bl" dir="5400000" dist="19050">
               <a:srgbClr val="000000">
-                <a:alpha val="49803"/>
+                <a:alpha val="49411"/>
               </a:srgbClr>
             </a:outerShdw>
           </a:effectLst>
@@ -14945,7 +14945,7 @@
           <a:effectLst>
             <a:outerShdw blurRad="57150" rotWithShape="0" algn="bl" dir="5400000" dist="19050">
               <a:srgbClr val="000000">
-                <a:alpha val="49803"/>
+                <a:alpha val="49411"/>
               </a:srgbClr>
             </a:outerShdw>
           </a:effectLst>
@@ -15019,7 +15019,7 @@
           <a:effectLst>
             <a:outerShdw blurRad="57150" rotWithShape="0" algn="bl" dir="5400000" dist="19050">
               <a:srgbClr val="000000">
-                <a:alpha val="49803"/>
+                <a:alpha val="49411"/>
               </a:srgbClr>
             </a:outerShdw>
           </a:effectLst>
@@ -15093,7 +15093,7 @@
           <a:effectLst>
             <a:outerShdw blurRad="57150" rotWithShape="0" algn="bl" dir="5400000" dist="19050">
               <a:srgbClr val="000000">
-                <a:alpha val="49803"/>
+                <a:alpha val="49411"/>
               </a:srgbClr>
             </a:outerShdw>
           </a:effectLst>
@@ -15167,7 +15167,7 @@
           <a:effectLst>
             <a:outerShdw blurRad="57150" rotWithShape="0" algn="bl" dir="5400000" dist="19050">
               <a:srgbClr val="000000">
-                <a:alpha val="49803"/>
+                <a:alpha val="49411"/>
               </a:srgbClr>
             </a:outerShdw>
           </a:effectLst>
@@ -15241,7 +15241,7 @@
           <a:effectLst>
             <a:outerShdw blurRad="57150" rotWithShape="0" algn="bl" dir="5400000" dist="19050">
               <a:srgbClr val="000000">
-                <a:alpha val="49803"/>
+                <a:alpha val="49411"/>
               </a:srgbClr>
             </a:outerShdw>
           </a:effectLst>
@@ -15315,7 +15315,7 @@
           <a:effectLst>
             <a:outerShdw blurRad="57150" rotWithShape="0" algn="bl" dir="5400000" dist="19050">
               <a:srgbClr val="000000">
-                <a:alpha val="49803"/>
+                <a:alpha val="49411"/>
               </a:srgbClr>
             </a:outerShdw>
           </a:effectLst>
@@ -15389,7 +15389,7 @@
           <a:effectLst>
             <a:outerShdw blurRad="57150" rotWithShape="0" algn="bl" dir="5400000" dist="19050">
               <a:srgbClr val="000000">
-                <a:alpha val="49803"/>
+                <a:alpha val="49411"/>
               </a:srgbClr>
             </a:outerShdw>
           </a:effectLst>
@@ -15440,7 +15440,7 @@
         </p:nvCxnSpPr>
         <p:spPr>
           <a:xfrm>
-            <a:off x="2828838" y="3552050"/>
+            <a:off x="2295438" y="6066650"/>
             <a:ext cx="0" cy="1507800"/>
           </a:xfrm>
           <a:prstGeom prst="straightConnector1">
@@ -15555,7 +15555,7 @@
           <a:effectLst>
             <a:outerShdw blurRad="57150" rotWithShape="0" algn="bl" dir="5400000" dist="19050">
               <a:srgbClr val="000000">
-                <a:alpha val="49803"/>
+                <a:alpha val="49411"/>
               </a:srgbClr>
             </a:outerShdw>
           </a:effectLst>
@@ -15629,7 +15629,7 @@
           <a:effectLst>
             <a:outerShdw blurRad="57150" rotWithShape="0" algn="bl" dir="5400000" dist="19050">
               <a:srgbClr val="000000">
-                <a:alpha val="49803"/>
+                <a:alpha val="49411"/>
               </a:srgbClr>
             </a:outerShdw>
           </a:effectLst>
@@ -15703,7 +15703,7 @@
           <a:effectLst>
             <a:outerShdw blurRad="57150" rotWithShape="0" algn="bl" dir="5400000" dist="19050">
               <a:srgbClr val="000000">
-                <a:alpha val="49803"/>
+                <a:alpha val="49411"/>
               </a:srgbClr>
             </a:outerShdw>
           </a:effectLst>
@@ -15777,7 +15777,7 @@
           <a:effectLst>
             <a:outerShdw blurRad="57150" rotWithShape="0" algn="bl" dir="5400000" dist="19050">
               <a:srgbClr val="000000">
-                <a:alpha val="49803"/>
+                <a:alpha val="49411"/>
               </a:srgbClr>
             </a:outerShdw>
           </a:effectLst>
@@ -15851,7 +15851,7 @@
           <a:effectLst>
             <a:outerShdw blurRad="57150" rotWithShape="0" algn="bl" dir="5400000" dist="19050">
               <a:srgbClr val="000000">
-                <a:alpha val="49803"/>
+                <a:alpha val="49411"/>
               </a:srgbClr>
             </a:outerShdw>
           </a:effectLst>
@@ -15925,7 +15925,7 @@
           <a:effectLst>
             <a:outerShdw blurRad="57150" rotWithShape="0" algn="bl" dir="5400000" dist="19050">
               <a:srgbClr val="000000">
-                <a:alpha val="49803"/>
+                <a:alpha val="49411"/>
               </a:srgbClr>
             </a:outerShdw>
           </a:effectLst>
@@ -15999,7 +15999,7 @@
           <a:effectLst>
             <a:outerShdw blurRad="57150" rotWithShape="0" algn="bl" dir="5400000" dist="19050">
               <a:srgbClr val="000000">
-                <a:alpha val="49803"/>
+                <a:alpha val="49411"/>
               </a:srgbClr>
             </a:outerShdw>
           </a:effectLst>
@@ -16073,7 +16073,7 @@
           <a:effectLst>
             <a:outerShdw blurRad="57150" rotWithShape="0" algn="bl" dir="5400000" dist="19050">
               <a:srgbClr val="000000">
-                <a:alpha val="49803"/>
+                <a:alpha val="49411"/>
               </a:srgbClr>
             </a:outerShdw>
           </a:effectLst>
@@ -16147,7 +16147,7 @@
           <a:effectLst>
             <a:outerShdw blurRad="57150" rotWithShape="0" algn="bl" dir="5400000" dist="19050">
               <a:srgbClr val="000000">
-                <a:alpha val="49803"/>
+                <a:alpha val="49411"/>
               </a:srgbClr>
             </a:outerShdw>
           </a:effectLst>
@@ -16221,7 +16221,7 @@
           <a:effectLst>
             <a:outerShdw blurRad="57150" rotWithShape="0" algn="bl" dir="5400000" dist="19050">
               <a:srgbClr val="000000">
-                <a:alpha val="49803"/>
+                <a:alpha val="49411"/>
               </a:srgbClr>
             </a:outerShdw>
           </a:effectLst>
@@ -16295,7 +16295,7 @@
           <a:effectLst>
             <a:outerShdw blurRad="57150" rotWithShape="0" algn="bl" dir="5400000" dist="19050">
               <a:srgbClr val="000000">
-                <a:alpha val="49803"/>
+                <a:alpha val="49411"/>
               </a:srgbClr>
             </a:outerShdw>
           </a:effectLst>
@@ -16369,7 +16369,7 @@
           <a:effectLst>
             <a:outerShdw blurRad="57150" rotWithShape="0" algn="bl" dir="5400000" dist="19050">
               <a:srgbClr val="000000">
-                <a:alpha val="49803"/>
+                <a:alpha val="49411"/>
               </a:srgbClr>
             </a:outerShdw>
           </a:effectLst>
@@ -16443,7 +16443,7 @@
           <a:effectLst>
             <a:outerShdw blurRad="57150" rotWithShape="0" algn="bl" dir="5400000" dist="19050">
               <a:srgbClr val="000000">
-                <a:alpha val="49803"/>
+                <a:alpha val="49411"/>
               </a:srgbClr>
             </a:outerShdw>
           </a:effectLst>
@@ -16832,7 +16832,7 @@
           <a:effectLst>
             <a:outerShdw blurRad="57150" rotWithShape="0" algn="bl" dir="5400000" dist="19050">
               <a:srgbClr val="000000">
-                <a:alpha val="49803"/>
+                <a:alpha val="49411"/>
               </a:srgbClr>
             </a:outerShdw>
           </a:effectLst>
@@ -16906,7 +16906,7 @@
           <a:effectLst>
             <a:outerShdw blurRad="57150" rotWithShape="0" algn="bl" dir="5400000" dist="19050">
               <a:srgbClr val="000000">
-                <a:alpha val="49803"/>
+                <a:alpha val="49411"/>
               </a:srgbClr>
             </a:outerShdw>
           </a:effectLst>
@@ -16980,7 +16980,7 @@
           <a:effectLst>
             <a:outerShdw blurRad="57150" rotWithShape="0" algn="bl" dir="5400000" dist="19050">
               <a:srgbClr val="000000">
-                <a:alpha val="49803"/>
+                <a:alpha val="49411"/>
               </a:srgbClr>
             </a:outerShdw>
           </a:effectLst>
@@ -17054,7 +17054,7 @@
           <a:effectLst>
             <a:outerShdw blurRad="57150" rotWithShape="0" algn="bl" dir="5400000" dist="19050">
               <a:srgbClr val="000000">
-                <a:alpha val="49803"/>
+                <a:alpha val="49411"/>
               </a:srgbClr>
             </a:outerShdw>
           </a:effectLst>
@@ -17128,7 +17128,7 @@
           <a:effectLst>
             <a:outerShdw blurRad="57150" rotWithShape="0" algn="bl" dir="5400000" dist="19050">
               <a:srgbClr val="000000">
-                <a:alpha val="49803"/>
+                <a:alpha val="49411"/>
               </a:srgbClr>
             </a:outerShdw>
           </a:effectLst>
@@ -17202,7 +17202,7 @@
           <a:effectLst>
             <a:outerShdw blurRad="57150" rotWithShape="0" algn="bl" dir="5400000" dist="19050">
               <a:srgbClr val="000000">
-                <a:alpha val="49803"/>
+                <a:alpha val="49411"/>
               </a:srgbClr>
             </a:outerShdw>
           </a:effectLst>
@@ -17276,7 +17276,7 @@
           <a:effectLst>
             <a:outerShdw blurRad="57150" rotWithShape="0" algn="bl" dir="5400000" dist="19050">
               <a:srgbClr val="000000">
-                <a:alpha val="49803"/>
+                <a:alpha val="49411"/>
               </a:srgbClr>
             </a:outerShdw>
           </a:effectLst>
@@ -17350,7 +17350,7 @@
           <a:effectLst>
             <a:outerShdw blurRad="57150" rotWithShape="0" algn="bl" dir="5400000" dist="19050">
               <a:srgbClr val="000000">
-                <a:alpha val="49803"/>
+                <a:alpha val="49411"/>
               </a:srgbClr>
             </a:outerShdw>
           </a:effectLst>
@@ -17424,7 +17424,7 @@
           <a:effectLst>
             <a:outerShdw blurRad="57150" rotWithShape="0" algn="bl" dir="5400000" dist="19050">
               <a:srgbClr val="000000">
-                <a:alpha val="49803"/>
+                <a:alpha val="49411"/>
               </a:srgbClr>
             </a:outerShdw>
           </a:effectLst>
@@ -17498,7 +17498,7 @@
           <a:effectLst>
             <a:outerShdw blurRad="57150" rotWithShape="0" algn="bl" dir="5400000" dist="19050">
               <a:srgbClr val="000000">
-                <a:alpha val="49803"/>
+                <a:alpha val="49411"/>
               </a:srgbClr>
             </a:outerShdw>
           </a:effectLst>
@@ -17572,7 +17572,7 @@
           <a:effectLst>
             <a:outerShdw blurRad="57150" rotWithShape="0" algn="bl" dir="5400000" dist="19050">
               <a:srgbClr val="000000">
-                <a:alpha val="49803"/>
+                <a:alpha val="49411"/>
               </a:srgbClr>
             </a:outerShdw>
           </a:effectLst>
@@ -17646,7 +17646,7 @@
           <a:effectLst>
             <a:outerShdw blurRad="57150" rotWithShape="0" algn="bl" dir="5400000" dist="19050">
               <a:srgbClr val="000000">
-                <a:alpha val="49803"/>
+                <a:alpha val="49411"/>
               </a:srgbClr>
             </a:outerShdw>
           </a:effectLst>
@@ -17720,7 +17720,7 @@
           <a:effectLst>
             <a:outerShdw blurRad="57150" rotWithShape="0" algn="bl" dir="5400000" dist="19050">
               <a:srgbClr val="000000">
-                <a:alpha val="49803"/>
+                <a:alpha val="49411"/>
               </a:srgbClr>
             </a:outerShdw>
           </a:effectLst>
@@ -17794,7 +17794,7 @@
           <a:effectLst>
             <a:outerShdw blurRad="57150" rotWithShape="0" algn="bl" dir="5400000" dist="19050">
               <a:srgbClr val="000000">
-                <a:alpha val="49803"/>
+                <a:alpha val="49411"/>
               </a:srgbClr>
             </a:outerShdw>
           </a:effectLst>
@@ -17868,7 +17868,7 @@
           <a:effectLst>
             <a:outerShdw blurRad="57150" rotWithShape="0" algn="bl" dir="5400000" dist="19050">
               <a:srgbClr val="000000">
-                <a:alpha val="49803"/>
+                <a:alpha val="49411"/>
               </a:srgbClr>
             </a:outerShdw>
           </a:effectLst>
@@ -17942,7 +17942,7 @@
           <a:effectLst>
             <a:outerShdw blurRad="57150" rotWithShape="0" algn="bl" dir="5400000" dist="19050">
               <a:srgbClr val="000000">
-                <a:alpha val="49803"/>
+                <a:alpha val="49411"/>
               </a:srgbClr>
             </a:outerShdw>
           </a:effectLst>
@@ -18016,7 +18016,7 @@
           <a:effectLst>
             <a:outerShdw blurRad="57150" rotWithShape="0" algn="bl" dir="5400000" dist="19050">
               <a:srgbClr val="000000">
-                <a:alpha val="49803"/>
+                <a:alpha val="49411"/>
               </a:srgbClr>
             </a:outerShdw>
           </a:effectLst>
@@ -18090,7 +18090,7 @@
           <a:effectLst>
             <a:outerShdw blurRad="57150" rotWithShape="0" algn="bl" dir="5400000" dist="19050">
               <a:srgbClr val="000000">
-                <a:alpha val="49803"/>
+                <a:alpha val="49411"/>
               </a:srgbClr>
             </a:outerShdw>
           </a:effectLst>
@@ -18164,7 +18164,7 @@
           <a:effectLst>
             <a:outerShdw blurRad="57150" rotWithShape="0" algn="bl" dir="5400000" dist="19050">
               <a:srgbClr val="000000">
-                <a:alpha val="49803"/>
+                <a:alpha val="49411"/>
               </a:srgbClr>
             </a:outerShdw>
           </a:effectLst>
@@ -18238,7 +18238,7 @@
           <a:effectLst>
             <a:outerShdw blurRad="57150" rotWithShape="0" algn="bl" dir="5400000" dist="19050">
               <a:srgbClr val="000000">
-                <a:alpha val="49803"/>
+                <a:alpha val="49411"/>
               </a:srgbClr>
             </a:outerShdw>
           </a:effectLst>
@@ -18312,7 +18312,7 @@
           <a:effectLst>
             <a:outerShdw blurRad="57150" rotWithShape="0" algn="bl" dir="5400000" dist="19050">
               <a:srgbClr val="000000">
-                <a:alpha val="49803"/>
+                <a:alpha val="49411"/>
               </a:srgbClr>
             </a:outerShdw>
           </a:effectLst>
@@ -18386,7 +18386,7 @@
           <a:effectLst>
             <a:outerShdw blurRad="57150" rotWithShape="0" algn="bl" dir="5400000" dist="19050">
               <a:srgbClr val="000000">
-                <a:alpha val="49803"/>
+                <a:alpha val="49411"/>
               </a:srgbClr>
             </a:outerShdw>
           </a:effectLst>
@@ -18460,7 +18460,7 @@
           <a:effectLst>
             <a:outerShdw blurRad="57150" rotWithShape="0" algn="bl" dir="5400000" dist="19050">
               <a:srgbClr val="000000">
-                <a:alpha val="49803"/>
+                <a:alpha val="49411"/>
               </a:srgbClr>
             </a:outerShdw>
           </a:effectLst>
@@ -18534,7 +18534,7 @@
           <a:effectLst>
             <a:outerShdw blurRad="57150" rotWithShape="0" algn="bl" dir="5400000" dist="19050">
               <a:srgbClr val="000000">
-                <a:alpha val="49803"/>
+                <a:alpha val="49411"/>
               </a:srgbClr>
             </a:outerShdw>
           </a:effectLst>
@@ -18608,7 +18608,7 @@
           <a:effectLst>
             <a:outerShdw blurRad="57150" rotWithShape="0" algn="bl" dir="5400000" dist="19050">
               <a:srgbClr val="000000">
-                <a:alpha val="49803"/>
+                <a:alpha val="49411"/>
               </a:srgbClr>
             </a:outerShdw>
           </a:effectLst>
@@ -18682,7 +18682,7 @@
           <a:effectLst>
             <a:outerShdw blurRad="57150" rotWithShape="0" algn="bl" dir="5400000" dist="19050">
               <a:srgbClr val="000000">
-                <a:alpha val="49803"/>
+                <a:alpha val="49411"/>
               </a:srgbClr>
             </a:outerShdw>
           </a:effectLst>
@@ -18756,7 +18756,7 @@
           <a:effectLst>
             <a:outerShdw blurRad="57150" rotWithShape="0" algn="bl" dir="5400000" dist="19050">
               <a:srgbClr val="000000">
-                <a:alpha val="49803"/>
+                <a:alpha val="49411"/>
               </a:srgbClr>
             </a:outerShdw>
           </a:effectLst>
@@ -20911,13 +20911,12 @@
           <p:cNvPicPr preferRelativeResize="0"/>
           <p:nvPr/>
         </p:nvPicPr>
-        <p:blipFill>
+        <p:blipFill rotWithShape="1">
           <a:blip r:embed="rId5">
             <a:alphaModFix/>
           </a:blip>
-          <a:stretch>
-            <a:fillRect/>
-          </a:stretch>
+          <a:srcRect b="0" l="0" r="0" t="0"/>
+          <a:stretch/>
         </p:blipFill>
         <p:spPr>
           <a:xfrm>
@@ -24929,6 +24928,285 @@
 </file>
 
 <file path=ppt/theme/theme1.xml><?xml version="1.0" encoding="utf-8"?>
+<a:theme xmlns:a="http://schemas.openxmlformats.org/drawingml/2006/main" xmlns:r="http://schemas.openxmlformats.org/officeDocument/2006/relationships">
+  <a:themeElements>
+    <a:clrScheme name="Default">
+      <a:dk1>
+        <a:srgbClr val="000000"/>
+      </a:dk1>
+      <a:lt1>
+        <a:srgbClr val="FFFFFF"/>
+      </a:lt1>
+      <a:dk2>
+        <a:srgbClr val="158158"/>
+      </a:dk2>
+      <a:lt2>
+        <a:srgbClr val="F3F3F3"/>
+      </a:lt2>
+      <a:accent1>
+        <a:srgbClr val="058DC7"/>
+      </a:accent1>
+      <a:accent2>
+        <a:srgbClr val="50B432"/>
+      </a:accent2>
+      <a:accent3>
+        <a:srgbClr val="ED561B"/>
+      </a:accent3>
+      <a:accent4>
+        <a:srgbClr val="EDEF00"/>
+      </a:accent4>
+      <a:accent5>
+        <a:srgbClr val="24CBE5"/>
+      </a:accent5>
+      <a:accent6>
+        <a:srgbClr val="64E572"/>
+      </a:accent6>
+      <a:hlink>
+        <a:srgbClr val="2200CC"/>
+      </a:hlink>
+      <a:folHlink>
+        <a:srgbClr val="551A8B"/>
+      </a:folHlink>
+    </a:clrScheme>
+    <a:fontScheme name="Office">
+      <a:majorFont>
+        <a:latin typeface="Arial"/>
+        <a:ea typeface=""/>
+        <a:cs typeface=""/>
+        <a:font script="Jpan" typeface="ＭＳ Ｐゴシック"/>
+        <a:font script="Hang" typeface="맑은 고딕"/>
+        <a:font script="Hans" typeface="宋体"/>
+        <a:font script="Hant" typeface="新細明體"/>
+        <a:font script="Arab" typeface="Times New Roman"/>
+        <a:font script="Hebr" typeface="Times New Roman"/>
+        <a:font script="Thai" typeface="Angsana New"/>
+        <a:font script="Ethi" typeface="Nyala"/>
+        <a:font script="Beng" typeface="Vrinda"/>
+        <a:font script="Gujr" typeface="Shruti"/>
+        <a:font script="Khmr" typeface="MoolBoran"/>
+        <a:font script="Knda" typeface="Tunga"/>
+        <a:font script="Guru" typeface="Raavi"/>
+        <a:font script="Cans" typeface="Euphemia"/>
+        <a:font script="Cher" typeface="Plantagenet Cherokee"/>
+        <a:font script="Yiii" typeface="Microsoft Yi Baiti"/>
+        <a:font script="Tibt" typeface="Microsoft Himalaya"/>
+        <a:font script="Thaa" typeface="MV Boli"/>
+        <a:font script="Deva" typeface="Mangal"/>
+        <a:font script="Telu" typeface="Gautami"/>
+        <a:font script="Taml" typeface="Latha"/>
+        <a:font script="Syrc" typeface="Estrangelo Edessa"/>
+        <a:font script="Orya" typeface="Kalinga"/>
+        <a:font script="Mlym" typeface="Kartika"/>
+        <a:font script="Laoo" typeface="DokChampa"/>
+        <a:font script="Sinh" typeface="Iskoola Pota"/>
+        <a:font script="Mong" typeface="Mongolian Baiti"/>
+        <a:font script="Viet" typeface="Times New Roman"/>
+        <a:font script="Uigh" typeface="Microsoft Uighur"/>
+        <a:font script="Geor" typeface="Sylfaen"/>
+      </a:majorFont>
+      <a:minorFont>
+        <a:latin typeface="Arial"/>
+        <a:ea typeface=""/>
+        <a:cs typeface=""/>
+        <a:font script="Jpan" typeface="ＭＳ Ｐゴシック"/>
+        <a:font script="Hang" typeface="맑은 고딕"/>
+        <a:font script="Hans" typeface="宋体"/>
+        <a:font script="Hant" typeface="新細明體"/>
+        <a:font script="Arab" typeface="Arial"/>
+        <a:font script="Hebr" typeface="Arial"/>
+        <a:font script="Thai" typeface="Cordia New"/>
+        <a:font script="Ethi" typeface="Nyala"/>
+        <a:font script="Beng" typeface="Vrinda"/>
+        <a:font script="Gujr" typeface="Shruti"/>
+        <a:font script="Khmr" typeface="DaunPenh"/>
+        <a:font script="Knda" typeface="Tunga"/>
+        <a:font script="Guru" typeface="Raavi"/>
+        <a:font script="Cans" typeface="Euphemia"/>
+        <a:font script="Cher" typeface="Plantagenet Cherokee"/>
+        <a:font script="Yiii" typeface="Microsoft Yi Baiti"/>
+        <a:font script="Tibt" typeface="Microsoft Himalaya"/>
+        <a:font script="Thaa" typeface="MV Boli"/>
+        <a:font script="Deva" typeface="Mangal"/>
+        <a:font script="Telu" typeface="Gautami"/>
+        <a:font script="Taml" typeface="Latha"/>
+        <a:font script="Syrc" typeface="Estrangelo Edessa"/>
+        <a:font script="Orya" typeface="Kalinga"/>
+        <a:font script="Mlym" typeface="Kartika"/>
+        <a:font script="Laoo" typeface="DokChampa"/>
+        <a:font script="Sinh" typeface="Iskoola Pota"/>
+        <a:font script="Mong" typeface="Mongolian Baiti"/>
+        <a:font script="Viet" typeface="Arial"/>
+        <a:font script="Uigh" typeface="Microsoft Uighur"/>
+        <a:font script="Geor" typeface="Sylfaen"/>
+      </a:minorFont>
+    </a:fontScheme>
+    <a:fmtScheme name="Office">
+      <a:fillStyleLst>
+        <a:solidFill>
+          <a:schemeClr val="phClr"/>
+        </a:solidFill>
+        <a:gradFill rotWithShape="1">
+          <a:gsLst>
+            <a:gs pos="0">
+              <a:schemeClr val="phClr">
+                <a:tint val="50000"/>
+                <a:satMod val="300000"/>
+              </a:schemeClr>
+            </a:gs>
+            <a:gs pos="35000">
+              <a:schemeClr val="phClr">
+                <a:tint val="37000"/>
+                <a:satMod val="300000"/>
+              </a:schemeClr>
+            </a:gs>
+            <a:gs pos="100000">
+              <a:schemeClr val="phClr">
+                <a:tint val="15000"/>
+                <a:satMod val="350000"/>
+              </a:schemeClr>
+            </a:gs>
+          </a:gsLst>
+          <a:lin ang="16200000" scaled="1"/>
+        </a:gradFill>
+        <a:gradFill rotWithShape="1">
+          <a:gsLst>
+            <a:gs pos="0">
+              <a:schemeClr val="phClr">
+                <a:tint val="100000"/>
+                <a:shade val="100000"/>
+                <a:satMod val="130000"/>
+              </a:schemeClr>
+            </a:gs>
+            <a:gs pos="100000">
+              <a:schemeClr val="phClr">
+                <a:tint val="50000"/>
+                <a:shade val="100000"/>
+                <a:satMod val="350000"/>
+              </a:schemeClr>
+            </a:gs>
+          </a:gsLst>
+          <a:lin ang="16200000" scaled="0"/>
+        </a:gradFill>
+      </a:fillStyleLst>
+      <a:lnStyleLst>
+        <a:ln w="9525" cap="flat" cmpd="sng" algn="ctr">
+          <a:solidFill>
+            <a:schemeClr val="phClr">
+              <a:shade val="95000"/>
+              <a:satMod val="105000"/>
+            </a:schemeClr>
+          </a:solidFill>
+          <a:prstDash val="solid"/>
+        </a:ln>
+        <a:ln w="25400" cap="flat" cmpd="sng" algn="ctr">
+          <a:solidFill>
+            <a:schemeClr val="phClr"/>
+          </a:solidFill>
+          <a:prstDash val="solid"/>
+        </a:ln>
+        <a:ln w="38100" cap="flat" cmpd="sng" algn="ctr">
+          <a:solidFill>
+            <a:schemeClr val="phClr"/>
+          </a:solidFill>
+          <a:prstDash val="solid"/>
+        </a:ln>
+      </a:lnStyleLst>
+      <a:effectStyleLst>
+        <a:effectStyle>
+          <a:effectLst>
+            <a:outerShdw blurRad="40000" dist="20000" dir="5400000" rotWithShape="0">
+              <a:srgbClr val="000000">
+                <a:alpha val="38000"/>
+              </a:srgbClr>
+            </a:outerShdw>
+          </a:effectLst>
+        </a:effectStyle>
+        <a:effectStyle>
+          <a:effectLst>
+            <a:outerShdw blurRad="40000" dist="23000" dir="5400000" rotWithShape="0">
+              <a:srgbClr val="000000">
+                <a:alpha val="35000"/>
+              </a:srgbClr>
+            </a:outerShdw>
+          </a:effectLst>
+        </a:effectStyle>
+        <a:effectStyle>
+          <a:effectLst>
+            <a:outerShdw blurRad="40000" dist="23000" dir="5400000" rotWithShape="0">
+              <a:srgbClr val="000000">
+                <a:alpha val="35000"/>
+              </a:srgbClr>
+            </a:outerShdw>
+          </a:effectLst>
+          <a:scene3d>
+            <a:camera prst="orthographicFront">
+              <a:rot lat="0" lon="0" rev="0"/>
+            </a:camera>
+            <a:lightRig rig="threePt" dir="t">
+              <a:rot lat="0" lon="0" rev="1200000"/>
+            </a:lightRig>
+          </a:scene3d>
+          <a:sp3d>
+            <a:bevelT w="63500" h="25400"/>
+          </a:sp3d>
+        </a:effectStyle>
+      </a:effectStyleLst>
+      <a:bgFillStyleLst>
+        <a:solidFill>
+          <a:schemeClr val="phClr"/>
+        </a:solidFill>
+        <a:gradFill rotWithShape="1">
+          <a:gsLst>
+            <a:gs pos="0">
+              <a:schemeClr val="phClr">
+                <a:tint val="40000"/>
+                <a:satMod val="350000"/>
+              </a:schemeClr>
+            </a:gs>
+            <a:gs pos="40000">
+              <a:schemeClr val="phClr">
+                <a:tint val="45000"/>
+                <a:shade val="99000"/>
+                <a:satMod val="350000"/>
+              </a:schemeClr>
+            </a:gs>
+            <a:gs pos="100000">
+              <a:schemeClr val="phClr">
+                <a:shade val="20000"/>
+                <a:satMod val="255000"/>
+              </a:schemeClr>
+            </a:gs>
+          </a:gsLst>
+          <a:path path="circle">
+            <a:fillToRect l="50000" t="-80000" r="50000" b="180000"/>
+          </a:path>
+        </a:gradFill>
+        <a:gradFill rotWithShape="1">
+          <a:gsLst>
+            <a:gs pos="0">
+              <a:schemeClr val="phClr">
+                <a:tint val="80000"/>
+                <a:satMod val="300000"/>
+              </a:schemeClr>
+            </a:gs>
+            <a:gs pos="100000">
+              <a:schemeClr val="phClr">
+                <a:shade val="30000"/>
+                <a:satMod val="200000"/>
+              </a:schemeClr>
+            </a:gs>
+          </a:gsLst>
+          <a:path path="circle">
+            <a:fillToRect l="50000" t="50000" r="50000" b="50000"/>
+          </a:path>
+        </a:gradFill>
+      </a:bgFillStyleLst>
+    </a:fmtScheme>
+  </a:themeElements>
+</a:theme>
+</file>
+
+<file path=ppt/theme/theme2.xml><?xml version="1.0" encoding="utf-8"?>
 <a:theme xmlns:a="http://schemas.openxmlformats.org/drawingml/2006/main" xmlns:r="http://schemas.openxmlformats.org/officeDocument/2006/relationships" name="1_Activeeon Presentation Template">
   <a:themeElements>
     <a:clrScheme name="AE Blue">
@@ -25205,283 +25483,4 @@
     </a:fmtScheme>
   </a:themeElements>
 </a:theme>
-</file>
-
-<file path=ppt/theme/theme2.xml><?xml version="1.0" encoding="utf-8"?>
-<a:theme xmlns:a="http://schemas.openxmlformats.org/drawingml/2006/main" xmlns:r="http://schemas.openxmlformats.org/officeDocument/2006/relationships">
-  <a:themeElements>
-    <a:clrScheme name="Default">
-      <a:dk1>
-        <a:srgbClr val="000000"/>
-      </a:dk1>
-      <a:lt1>
-        <a:srgbClr val="FFFFFF"/>
-      </a:lt1>
-      <a:dk2>
-        <a:srgbClr val="158158"/>
-      </a:dk2>
-      <a:lt2>
-        <a:srgbClr val="F3F3F3"/>
-      </a:lt2>
-      <a:accent1>
-        <a:srgbClr val="058DC7"/>
-      </a:accent1>
-      <a:accent2>
-        <a:srgbClr val="50B432"/>
-      </a:accent2>
-      <a:accent3>
-        <a:srgbClr val="ED561B"/>
-      </a:accent3>
-      <a:accent4>
-        <a:srgbClr val="EDEF00"/>
-      </a:accent4>
-      <a:accent5>
-        <a:srgbClr val="24CBE5"/>
-      </a:accent5>
-      <a:accent6>
-        <a:srgbClr val="64E572"/>
-      </a:accent6>
-      <a:hlink>
-        <a:srgbClr val="2200CC"/>
-      </a:hlink>
-      <a:folHlink>
-        <a:srgbClr val="551A8B"/>
-      </a:folHlink>
-    </a:clrScheme>
-    <a:fontScheme name="Office">
-      <a:majorFont>
-        <a:latin typeface="Arial"/>
-        <a:ea typeface=""/>
-        <a:cs typeface=""/>
-        <a:font script="Jpan" typeface="ＭＳ Ｐゴシック"/>
-        <a:font script="Hang" typeface="맑은 고딕"/>
-        <a:font script="Hans" typeface="宋体"/>
-        <a:font script="Hant" typeface="新細明體"/>
-        <a:font script="Arab" typeface="Times New Roman"/>
-        <a:font script="Hebr" typeface="Times New Roman"/>
-        <a:font script="Thai" typeface="Angsana New"/>
-        <a:font script="Ethi" typeface="Nyala"/>
-        <a:font script="Beng" typeface="Vrinda"/>
-        <a:font script="Gujr" typeface="Shruti"/>
-        <a:font script="Khmr" typeface="MoolBoran"/>
-        <a:font script="Knda" typeface="Tunga"/>
-        <a:font script="Guru" typeface="Raavi"/>
-        <a:font script="Cans" typeface="Euphemia"/>
-        <a:font script="Cher" typeface="Plantagenet Cherokee"/>
-        <a:font script="Yiii" typeface="Microsoft Yi Baiti"/>
-        <a:font script="Tibt" typeface="Microsoft Himalaya"/>
-        <a:font script="Thaa" typeface="MV Boli"/>
-        <a:font script="Deva" typeface="Mangal"/>
-        <a:font script="Telu" typeface="Gautami"/>
-        <a:font script="Taml" typeface="Latha"/>
-        <a:font script="Syrc" typeface="Estrangelo Edessa"/>
-        <a:font script="Orya" typeface="Kalinga"/>
-        <a:font script="Mlym" typeface="Kartika"/>
-        <a:font script="Laoo" typeface="DokChampa"/>
-        <a:font script="Sinh" typeface="Iskoola Pota"/>
-        <a:font script="Mong" typeface="Mongolian Baiti"/>
-        <a:font script="Viet" typeface="Times New Roman"/>
-        <a:font script="Uigh" typeface="Microsoft Uighur"/>
-        <a:font script="Geor" typeface="Sylfaen"/>
-      </a:majorFont>
-      <a:minorFont>
-        <a:latin typeface="Arial"/>
-        <a:ea typeface=""/>
-        <a:cs typeface=""/>
-        <a:font script="Jpan" typeface="ＭＳ Ｐゴシック"/>
-        <a:font script="Hang" typeface="맑은 고딕"/>
-        <a:font script="Hans" typeface="宋体"/>
-        <a:font script="Hant" typeface="新細明體"/>
-        <a:font script="Arab" typeface="Arial"/>
-        <a:font script="Hebr" typeface="Arial"/>
-        <a:font script="Thai" typeface="Cordia New"/>
-        <a:font script="Ethi" typeface="Nyala"/>
-        <a:font script="Beng" typeface="Vrinda"/>
-        <a:font script="Gujr" typeface="Shruti"/>
-        <a:font script="Khmr" typeface="DaunPenh"/>
-        <a:font script="Knda" typeface="Tunga"/>
-        <a:font script="Guru" typeface="Raavi"/>
-        <a:font script="Cans" typeface="Euphemia"/>
-        <a:font script="Cher" typeface="Plantagenet Cherokee"/>
-        <a:font script="Yiii" typeface="Microsoft Yi Baiti"/>
-        <a:font script="Tibt" typeface="Microsoft Himalaya"/>
-        <a:font script="Thaa" typeface="MV Boli"/>
-        <a:font script="Deva" typeface="Mangal"/>
-        <a:font script="Telu" typeface="Gautami"/>
-        <a:font script="Taml" typeface="Latha"/>
-        <a:font script="Syrc" typeface="Estrangelo Edessa"/>
-        <a:font script="Orya" typeface="Kalinga"/>
-        <a:font script="Mlym" typeface="Kartika"/>
-        <a:font script="Laoo" typeface="DokChampa"/>
-        <a:font script="Sinh" typeface="Iskoola Pota"/>
-        <a:font script="Mong" typeface="Mongolian Baiti"/>
-        <a:font script="Viet" typeface="Arial"/>
-        <a:font script="Uigh" typeface="Microsoft Uighur"/>
-        <a:font script="Geor" typeface="Sylfaen"/>
-      </a:minorFont>
-    </a:fontScheme>
-    <a:fmtScheme name="Office">
-      <a:fillStyleLst>
-        <a:solidFill>
-          <a:schemeClr val="phClr"/>
-        </a:solidFill>
-        <a:gradFill rotWithShape="1">
-          <a:gsLst>
-            <a:gs pos="0">
-              <a:schemeClr val="phClr">
-                <a:tint val="50000"/>
-                <a:satMod val="300000"/>
-              </a:schemeClr>
-            </a:gs>
-            <a:gs pos="35000">
-              <a:schemeClr val="phClr">
-                <a:tint val="37000"/>
-                <a:satMod val="300000"/>
-              </a:schemeClr>
-            </a:gs>
-            <a:gs pos="100000">
-              <a:schemeClr val="phClr">
-                <a:tint val="15000"/>
-                <a:satMod val="350000"/>
-              </a:schemeClr>
-            </a:gs>
-          </a:gsLst>
-          <a:lin ang="16200000" scaled="1"/>
-        </a:gradFill>
-        <a:gradFill rotWithShape="1">
-          <a:gsLst>
-            <a:gs pos="0">
-              <a:schemeClr val="phClr">
-                <a:tint val="100000"/>
-                <a:shade val="100000"/>
-                <a:satMod val="130000"/>
-              </a:schemeClr>
-            </a:gs>
-            <a:gs pos="100000">
-              <a:schemeClr val="phClr">
-                <a:tint val="50000"/>
-                <a:shade val="100000"/>
-                <a:satMod val="350000"/>
-              </a:schemeClr>
-            </a:gs>
-          </a:gsLst>
-          <a:lin ang="16200000" scaled="0"/>
-        </a:gradFill>
-      </a:fillStyleLst>
-      <a:lnStyleLst>
-        <a:ln w="9525" cap="flat" cmpd="sng" algn="ctr">
-          <a:solidFill>
-            <a:schemeClr val="phClr">
-              <a:shade val="95000"/>
-              <a:satMod val="105000"/>
-            </a:schemeClr>
-          </a:solidFill>
-          <a:prstDash val="solid"/>
-        </a:ln>
-        <a:ln w="25400" cap="flat" cmpd="sng" algn="ctr">
-          <a:solidFill>
-            <a:schemeClr val="phClr"/>
-          </a:solidFill>
-          <a:prstDash val="solid"/>
-        </a:ln>
-        <a:ln w="38100" cap="flat" cmpd="sng" algn="ctr">
-          <a:solidFill>
-            <a:schemeClr val="phClr"/>
-          </a:solidFill>
-          <a:prstDash val="solid"/>
-        </a:ln>
-      </a:lnStyleLst>
-      <a:effectStyleLst>
-        <a:effectStyle>
-          <a:effectLst>
-            <a:outerShdw blurRad="40000" dist="20000" dir="5400000" rotWithShape="0">
-              <a:srgbClr val="000000">
-                <a:alpha val="38000"/>
-              </a:srgbClr>
-            </a:outerShdw>
-          </a:effectLst>
-        </a:effectStyle>
-        <a:effectStyle>
-          <a:effectLst>
-            <a:outerShdw blurRad="40000" dist="23000" dir="5400000" rotWithShape="0">
-              <a:srgbClr val="000000">
-                <a:alpha val="35000"/>
-              </a:srgbClr>
-            </a:outerShdw>
-          </a:effectLst>
-        </a:effectStyle>
-        <a:effectStyle>
-          <a:effectLst>
-            <a:outerShdw blurRad="40000" dist="23000" dir="5400000" rotWithShape="0">
-              <a:srgbClr val="000000">
-                <a:alpha val="35000"/>
-              </a:srgbClr>
-            </a:outerShdw>
-          </a:effectLst>
-          <a:scene3d>
-            <a:camera prst="orthographicFront">
-              <a:rot lat="0" lon="0" rev="0"/>
-            </a:camera>
-            <a:lightRig rig="threePt" dir="t">
-              <a:rot lat="0" lon="0" rev="1200000"/>
-            </a:lightRig>
-          </a:scene3d>
-          <a:sp3d>
-            <a:bevelT w="63500" h="25400"/>
-          </a:sp3d>
-        </a:effectStyle>
-      </a:effectStyleLst>
-      <a:bgFillStyleLst>
-        <a:solidFill>
-          <a:schemeClr val="phClr"/>
-        </a:solidFill>
-        <a:gradFill rotWithShape="1">
-          <a:gsLst>
-            <a:gs pos="0">
-              <a:schemeClr val="phClr">
-                <a:tint val="40000"/>
-                <a:satMod val="350000"/>
-              </a:schemeClr>
-            </a:gs>
-            <a:gs pos="40000">
-              <a:schemeClr val="phClr">
-                <a:tint val="45000"/>
-                <a:shade val="99000"/>
-                <a:satMod val="350000"/>
-              </a:schemeClr>
-            </a:gs>
-            <a:gs pos="100000">
-              <a:schemeClr val="phClr">
-                <a:shade val="20000"/>
-                <a:satMod val="255000"/>
-              </a:schemeClr>
-            </a:gs>
-          </a:gsLst>
-          <a:path path="circle">
-            <a:fillToRect l="50000" t="-80000" r="50000" b="180000"/>
-          </a:path>
-        </a:gradFill>
-        <a:gradFill rotWithShape="1">
-          <a:gsLst>
-            <a:gs pos="0">
-              <a:schemeClr val="phClr">
-                <a:tint val="80000"/>
-                <a:satMod val="300000"/>
-              </a:schemeClr>
-            </a:gs>
-            <a:gs pos="100000">
-              <a:schemeClr val="phClr">
-                <a:shade val="30000"/>
-                <a:satMod val="200000"/>
-              </a:schemeClr>
-            </a:gs>
-          </a:gsLst>
-          <a:path path="circle">
-            <a:fillToRect l="50000" t="50000" r="50000" b="50000"/>
-          </a:path>
-        </a:gradFill>
-      </a:bgFillStyleLst>
-    </a:fmtScheme>
-  </a:themeElements>
-</a:theme>
 </file>
</xml_diff>

<commit_message>
Minor fix in inance doc
</commit_message>
<xml_diff>
--- a/Finance/resources/doc/dev/risk-valuation-proactive.pptx
+++ b/Finance/resources/doc/dev/risk-valuation-proactive.pptx
@@ -11085,7 +11085,7 @@
           <a:effectLst>
             <a:outerShdw blurRad="57150" rotWithShape="0" algn="bl" dir="5400000" dist="19050">
               <a:srgbClr val="000000">
-                <a:alpha val="49411"/>
+                <a:alpha val="49019"/>
               </a:srgbClr>
             </a:outerShdw>
           </a:effectLst>
@@ -11159,7 +11159,7 @@
           <a:effectLst>
             <a:outerShdw blurRad="57150" rotWithShape="0" algn="bl" dir="5400000" dist="19050">
               <a:srgbClr val="000000">
-                <a:alpha val="49411"/>
+                <a:alpha val="49019"/>
               </a:srgbClr>
             </a:outerShdw>
           </a:effectLst>
@@ -11233,7 +11233,7 @@
           <a:effectLst>
             <a:outerShdw blurRad="57150" rotWithShape="0" algn="bl" dir="5400000" dist="19050">
               <a:srgbClr val="000000">
-                <a:alpha val="49411"/>
+                <a:alpha val="49019"/>
               </a:srgbClr>
             </a:outerShdw>
           </a:effectLst>
@@ -11307,7 +11307,7 @@
           <a:effectLst>
             <a:outerShdw blurRad="57150" rotWithShape="0" algn="bl" dir="5400000" dist="19050">
               <a:srgbClr val="000000">
-                <a:alpha val="49411"/>
+                <a:alpha val="49019"/>
               </a:srgbClr>
             </a:outerShdw>
           </a:effectLst>
@@ -11381,7 +11381,7 @@
           <a:effectLst>
             <a:outerShdw blurRad="57150" rotWithShape="0" algn="bl" dir="5400000" dist="19050">
               <a:srgbClr val="000000">
-                <a:alpha val="49411"/>
+                <a:alpha val="49019"/>
               </a:srgbClr>
             </a:outerShdw>
           </a:effectLst>
@@ -11455,7 +11455,7 @@
           <a:effectLst>
             <a:outerShdw blurRad="57150" rotWithShape="0" algn="bl" dir="5400000" dist="19050">
               <a:srgbClr val="000000">
-                <a:alpha val="49411"/>
+                <a:alpha val="49019"/>
               </a:srgbClr>
             </a:outerShdw>
           </a:effectLst>
@@ -11529,7 +11529,7 @@
           <a:effectLst>
             <a:outerShdw blurRad="57150" rotWithShape="0" algn="bl" dir="5400000" dist="19050">
               <a:srgbClr val="000000">
-                <a:alpha val="49411"/>
+                <a:alpha val="49019"/>
               </a:srgbClr>
             </a:outerShdw>
           </a:effectLst>
@@ -11603,7 +11603,7 @@
           <a:effectLst>
             <a:outerShdw blurRad="57150" rotWithShape="0" algn="bl" dir="5400000" dist="19050">
               <a:srgbClr val="000000">
-                <a:alpha val="49411"/>
+                <a:alpha val="49019"/>
               </a:srgbClr>
             </a:outerShdw>
           </a:effectLst>
@@ -11677,7 +11677,7 @@
           <a:effectLst>
             <a:outerShdw blurRad="57150" rotWithShape="0" algn="bl" dir="5400000" dist="19050">
               <a:srgbClr val="000000">
-                <a:alpha val="49411"/>
+                <a:alpha val="49019"/>
               </a:srgbClr>
             </a:outerShdw>
           </a:effectLst>
@@ -11751,7 +11751,7 @@
           <a:effectLst>
             <a:outerShdw blurRad="57150" rotWithShape="0" algn="bl" dir="5400000" dist="19050">
               <a:srgbClr val="000000">
-                <a:alpha val="49411"/>
+                <a:alpha val="49019"/>
               </a:srgbClr>
             </a:outerShdw>
           </a:effectLst>
@@ -11825,7 +11825,7 @@
           <a:effectLst>
             <a:outerShdw blurRad="57150" rotWithShape="0" algn="bl" dir="5400000" dist="19050">
               <a:srgbClr val="000000">
-                <a:alpha val="49411"/>
+                <a:alpha val="49019"/>
               </a:srgbClr>
             </a:outerShdw>
           </a:effectLst>
@@ -11899,7 +11899,7 @@
           <a:effectLst>
             <a:outerShdw blurRad="57150" rotWithShape="0" algn="bl" dir="5400000" dist="19050">
               <a:srgbClr val="000000">
-                <a:alpha val="49411"/>
+                <a:alpha val="49019"/>
               </a:srgbClr>
             </a:outerShdw>
           </a:effectLst>
@@ -11973,7 +11973,7 @@
           <a:effectLst>
             <a:outerShdw blurRad="57150" rotWithShape="0" algn="bl" dir="5400000" dist="19050">
               <a:srgbClr val="000000">
-                <a:alpha val="49411"/>
+                <a:alpha val="49019"/>
               </a:srgbClr>
             </a:outerShdw>
           </a:effectLst>
@@ -12047,7 +12047,7 @@
           <a:effectLst>
             <a:outerShdw blurRad="57150" rotWithShape="0" algn="bl" dir="5400000" dist="19050">
               <a:srgbClr val="000000">
-                <a:alpha val="49411"/>
+                <a:alpha val="49019"/>
               </a:srgbClr>
             </a:outerShdw>
           </a:effectLst>
@@ -12121,7 +12121,7 @@
           <a:effectLst>
             <a:outerShdw blurRad="57150" rotWithShape="0" algn="bl" dir="5400000" dist="19050">
               <a:srgbClr val="000000">
-                <a:alpha val="49411"/>
+                <a:alpha val="49019"/>
               </a:srgbClr>
             </a:outerShdw>
           </a:effectLst>
@@ -12195,7 +12195,7 @@
           <a:effectLst>
             <a:outerShdw blurRad="57150" rotWithShape="0" algn="bl" dir="5400000" dist="19050">
               <a:srgbClr val="000000">
-                <a:alpha val="49411"/>
+                <a:alpha val="49019"/>
               </a:srgbClr>
             </a:outerShdw>
           </a:effectLst>
@@ -12269,7 +12269,7 @@
           <a:effectLst>
             <a:outerShdw blurRad="57150" rotWithShape="0" algn="bl" dir="5400000" dist="19050">
               <a:srgbClr val="000000">
-                <a:alpha val="49411"/>
+                <a:alpha val="49019"/>
               </a:srgbClr>
             </a:outerShdw>
           </a:effectLst>
@@ -12343,7 +12343,7 @@
           <a:effectLst>
             <a:outerShdw blurRad="57150" rotWithShape="0" algn="bl" dir="5400000" dist="19050">
               <a:srgbClr val="000000">
-                <a:alpha val="49411"/>
+                <a:alpha val="49019"/>
               </a:srgbClr>
             </a:outerShdw>
           </a:effectLst>
@@ -12417,7 +12417,7 @@
           <a:effectLst>
             <a:outerShdw blurRad="57150" rotWithShape="0" algn="bl" dir="5400000" dist="19050">
               <a:srgbClr val="000000">
-                <a:alpha val="49411"/>
+                <a:alpha val="49019"/>
               </a:srgbClr>
             </a:outerShdw>
           </a:effectLst>
@@ -12491,7 +12491,7 @@
           <a:effectLst>
             <a:outerShdw blurRad="57150" rotWithShape="0" algn="bl" dir="5400000" dist="19050">
               <a:srgbClr val="000000">
-                <a:alpha val="49411"/>
+                <a:alpha val="49019"/>
               </a:srgbClr>
             </a:outerShdw>
           </a:effectLst>
@@ -12565,7 +12565,7 @@
           <a:effectLst>
             <a:outerShdw blurRad="57150" rotWithShape="0" algn="bl" dir="5400000" dist="19050">
               <a:srgbClr val="000000">
-                <a:alpha val="49411"/>
+                <a:alpha val="49019"/>
               </a:srgbClr>
             </a:outerShdw>
           </a:effectLst>
@@ -12639,7 +12639,7 @@
           <a:effectLst>
             <a:outerShdw blurRad="57150" rotWithShape="0" algn="bl" dir="5400000" dist="19050">
               <a:srgbClr val="000000">
-                <a:alpha val="49411"/>
+                <a:alpha val="49019"/>
               </a:srgbClr>
             </a:outerShdw>
           </a:effectLst>
@@ -12713,7 +12713,7 @@
           <a:effectLst>
             <a:outerShdw blurRad="57150" rotWithShape="0" algn="bl" dir="5400000" dist="19050">
               <a:srgbClr val="000000">
-                <a:alpha val="49411"/>
+                <a:alpha val="49019"/>
               </a:srgbClr>
             </a:outerShdw>
           </a:effectLst>
@@ -12787,7 +12787,7 @@
           <a:effectLst>
             <a:outerShdw blurRad="57150" rotWithShape="0" algn="bl" dir="5400000" dist="19050">
               <a:srgbClr val="000000">
-                <a:alpha val="49411"/>
+                <a:alpha val="49019"/>
               </a:srgbClr>
             </a:outerShdw>
           </a:effectLst>
@@ -12861,7 +12861,7 @@
           <a:effectLst>
             <a:outerShdw blurRad="57150" rotWithShape="0" algn="bl" dir="5400000" dist="19050">
               <a:srgbClr val="000000">
-                <a:alpha val="49411"/>
+                <a:alpha val="49019"/>
               </a:srgbClr>
             </a:outerShdw>
           </a:effectLst>
@@ -12935,7 +12935,7 @@
           <a:effectLst>
             <a:outerShdw blurRad="57150" rotWithShape="0" algn="bl" dir="5400000" dist="19050">
               <a:srgbClr val="000000">
-                <a:alpha val="49411"/>
+                <a:alpha val="49019"/>
               </a:srgbClr>
             </a:outerShdw>
           </a:effectLst>
@@ -13009,7 +13009,7 @@
           <a:effectLst>
             <a:outerShdw blurRad="57150" rotWithShape="0" algn="bl" dir="5400000" dist="19050">
               <a:srgbClr val="000000">
-                <a:alpha val="49411"/>
+                <a:alpha val="49019"/>
               </a:srgbClr>
             </a:outerShdw>
           </a:effectLst>
@@ -13083,7 +13083,7 @@
           <a:effectLst>
             <a:outerShdw blurRad="57150" rotWithShape="0" algn="bl" dir="5400000" dist="19050">
               <a:srgbClr val="000000">
-                <a:alpha val="49411"/>
+                <a:alpha val="49019"/>
               </a:srgbClr>
             </a:outerShdw>
           </a:effectLst>
@@ -13157,7 +13157,7 @@
           <a:effectLst>
             <a:outerShdw blurRad="57150" rotWithShape="0" algn="bl" dir="5400000" dist="19050">
               <a:srgbClr val="000000">
-                <a:alpha val="49411"/>
+                <a:alpha val="49019"/>
               </a:srgbClr>
             </a:outerShdw>
           </a:effectLst>
@@ -13231,7 +13231,7 @@
           <a:effectLst>
             <a:outerShdw blurRad="57150" rotWithShape="0" algn="bl" dir="5400000" dist="19050">
               <a:srgbClr val="000000">
-                <a:alpha val="49411"/>
+                <a:alpha val="49019"/>
               </a:srgbClr>
             </a:outerShdw>
           </a:effectLst>
@@ -13305,7 +13305,7 @@
           <a:effectLst>
             <a:outerShdw blurRad="57150" rotWithShape="0" algn="bl" dir="5400000" dist="19050">
               <a:srgbClr val="000000">
-                <a:alpha val="49411"/>
+                <a:alpha val="49019"/>
               </a:srgbClr>
             </a:outerShdw>
           </a:effectLst>
@@ -13379,7 +13379,7 @@
           <a:effectLst>
             <a:outerShdw blurRad="57150" rotWithShape="0" algn="bl" dir="5400000" dist="19050">
               <a:srgbClr val="000000">
-                <a:alpha val="49411"/>
+                <a:alpha val="49019"/>
               </a:srgbClr>
             </a:outerShdw>
           </a:effectLst>
@@ -13453,7 +13453,7 @@
           <a:effectLst>
             <a:outerShdw blurRad="57150" rotWithShape="0" algn="bl" dir="5400000" dist="19050">
               <a:srgbClr val="000000">
-                <a:alpha val="49411"/>
+                <a:alpha val="49019"/>
               </a:srgbClr>
             </a:outerShdw>
           </a:effectLst>
@@ -13527,7 +13527,7 @@
           <a:effectLst>
             <a:outerShdw blurRad="57150" rotWithShape="0" algn="bl" dir="5400000" dist="19050">
               <a:srgbClr val="000000">
-                <a:alpha val="49411"/>
+                <a:alpha val="49019"/>
               </a:srgbClr>
             </a:outerShdw>
           </a:effectLst>
@@ -13601,7 +13601,7 @@
           <a:effectLst>
             <a:outerShdw blurRad="57150" rotWithShape="0" algn="bl" dir="5400000" dist="19050">
               <a:srgbClr val="000000">
-                <a:alpha val="49411"/>
+                <a:alpha val="49019"/>
               </a:srgbClr>
             </a:outerShdw>
           </a:effectLst>
@@ -13675,7 +13675,7 @@
           <a:effectLst>
             <a:outerShdw blurRad="57150" rotWithShape="0" algn="bl" dir="5400000" dist="19050">
               <a:srgbClr val="000000">
-                <a:alpha val="49411"/>
+                <a:alpha val="49019"/>
               </a:srgbClr>
             </a:outerShdw>
           </a:effectLst>
@@ -13749,7 +13749,7 @@
           <a:effectLst>
             <a:outerShdw blurRad="57150" rotWithShape="0" algn="bl" dir="5400000" dist="19050">
               <a:srgbClr val="000000">
-                <a:alpha val="49411"/>
+                <a:alpha val="49019"/>
               </a:srgbClr>
             </a:outerShdw>
           </a:effectLst>
@@ -13823,7 +13823,7 @@
           <a:effectLst>
             <a:outerShdw blurRad="57150" rotWithShape="0" algn="bl" dir="5400000" dist="19050">
               <a:srgbClr val="000000">
-                <a:alpha val="49411"/>
+                <a:alpha val="49019"/>
               </a:srgbClr>
             </a:outerShdw>
           </a:effectLst>
@@ -13897,7 +13897,7 @@
           <a:effectLst>
             <a:outerShdw blurRad="57150" rotWithShape="0" algn="bl" dir="5400000" dist="19050">
               <a:srgbClr val="000000">
-                <a:alpha val="49411"/>
+                <a:alpha val="49019"/>
               </a:srgbClr>
             </a:outerShdw>
           </a:effectLst>
@@ -13971,7 +13971,7 @@
           <a:effectLst>
             <a:outerShdw blurRad="57150" rotWithShape="0" algn="bl" dir="5400000" dist="19050">
               <a:srgbClr val="000000">
-                <a:alpha val="49411"/>
+                <a:alpha val="49019"/>
               </a:srgbClr>
             </a:outerShdw>
           </a:effectLst>
@@ -14045,7 +14045,7 @@
           <a:effectLst>
             <a:outerShdw blurRad="57150" rotWithShape="0" algn="bl" dir="5400000" dist="19050">
               <a:srgbClr val="000000">
-                <a:alpha val="49411"/>
+                <a:alpha val="49019"/>
               </a:srgbClr>
             </a:outerShdw>
           </a:effectLst>
@@ -14119,7 +14119,7 @@
           <a:effectLst>
             <a:outerShdw blurRad="57150" rotWithShape="0" algn="bl" dir="5400000" dist="19050">
               <a:srgbClr val="000000">
-                <a:alpha val="49411"/>
+                <a:alpha val="49019"/>
               </a:srgbClr>
             </a:outerShdw>
           </a:effectLst>
@@ -14193,7 +14193,7 @@
           <a:effectLst>
             <a:outerShdw blurRad="57150" rotWithShape="0" algn="bl" dir="5400000" dist="19050">
               <a:srgbClr val="000000">
-                <a:alpha val="49411"/>
+                <a:alpha val="49019"/>
               </a:srgbClr>
             </a:outerShdw>
           </a:effectLst>
@@ -14267,7 +14267,7 @@
           <a:effectLst>
             <a:outerShdw blurRad="57150" rotWithShape="0" algn="bl" dir="5400000" dist="19050">
               <a:srgbClr val="000000">
-                <a:alpha val="49411"/>
+                <a:alpha val="49019"/>
               </a:srgbClr>
             </a:outerShdw>
           </a:effectLst>
@@ -14470,7 +14470,7 @@
         </p:nvCxnSpPr>
         <p:spPr>
           <a:xfrm flipH="1" rot="10800000">
-            <a:off x="3277425" y="6220550"/>
+            <a:off x="3277425" y="6296750"/>
             <a:ext cx="483300" cy="478500"/>
           </a:xfrm>
           <a:prstGeom prst="straightConnector1">
@@ -14602,8 +14602,8 @@
         </p:nvSpPr>
         <p:spPr>
           <a:xfrm>
-            <a:off x="1791750" y="3478300"/>
-            <a:ext cx="2189400" cy="694800"/>
+            <a:off x="1201425" y="6970263"/>
+            <a:ext cx="2189400" cy="515100"/>
           </a:xfrm>
           <a:prstGeom prst="rect">
             <a:avLst/>
@@ -14708,8 +14708,8 @@
         </p:nvSpPr>
         <p:spPr>
           <a:xfrm>
-            <a:off x="3469800" y="6316988"/>
-            <a:ext cx="2359800" cy="694800"/>
+            <a:off x="3622200" y="6393196"/>
+            <a:ext cx="1494300" cy="478500"/>
           </a:xfrm>
           <a:prstGeom prst="rect">
             <a:avLst/>
@@ -14797,7 +14797,7 @@
           <a:effectLst>
             <a:outerShdw blurRad="57150" rotWithShape="0" algn="bl" dir="5400000" dist="19050">
               <a:srgbClr val="000000">
-                <a:alpha val="49411"/>
+                <a:alpha val="49019"/>
               </a:srgbClr>
             </a:outerShdw>
           </a:effectLst>
@@ -14871,7 +14871,7 @@
           <a:effectLst>
             <a:outerShdw blurRad="57150" rotWithShape="0" algn="bl" dir="5400000" dist="19050">
               <a:srgbClr val="000000">
-                <a:alpha val="49411"/>
+                <a:alpha val="49019"/>
               </a:srgbClr>
             </a:outerShdw>
           </a:effectLst>
@@ -14945,7 +14945,7 @@
           <a:effectLst>
             <a:outerShdw blurRad="57150" rotWithShape="0" algn="bl" dir="5400000" dist="19050">
               <a:srgbClr val="000000">
-                <a:alpha val="49411"/>
+                <a:alpha val="49019"/>
               </a:srgbClr>
             </a:outerShdw>
           </a:effectLst>
@@ -15019,7 +15019,7 @@
           <a:effectLst>
             <a:outerShdw blurRad="57150" rotWithShape="0" algn="bl" dir="5400000" dist="19050">
               <a:srgbClr val="000000">
-                <a:alpha val="49411"/>
+                <a:alpha val="49019"/>
               </a:srgbClr>
             </a:outerShdw>
           </a:effectLst>
@@ -15093,7 +15093,7 @@
           <a:effectLst>
             <a:outerShdw blurRad="57150" rotWithShape="0" algn="bl" dir="5400000" dist="19050">
               <a:srgbClr val="000000">
-                <a:alpha val="49411"/>
+                <a:alpha val="49019"/>
               </a:srgbClr>
             </a:outerShdw>
           </a:effectLst>
@@ -15167,7 +15167,7 @@
           <a:effectLst>
             <a:outerShdw blurRad="57150" rotWithShape="0" algn="bl" dir="5400000" dist="19050">
               <a:srgbClr val="000000">
-                <a:alpha val="49411"/>
+                <a:alpha val="49019"/>
               </a:srgbClr>
             </a:outerShdw>
           </a:effectLst>
@@ -15241,7 +15241,7 @@
           <a:effectLst>
             <a:outerShdw blurRad="57150" rotWithShape="0" algn="bl" dir="5400000" dist="19050">
               <a:srgbClr val="000000">
-                <a:alpha val="49411"/>
+                <a:alpha val="49019"/>
               </a:srgbClr>
             </a:outerShdw>
           </a:effectLst>
@@ -15315,7 +15315,7 @@
           <a:effectLst>
             <a:outerShdw blurRad="57150" rotWithShape="0" algn="bl" dir="5400000" dist="19050">
               <a:srgbClr val="000000">
-                <a:alpha val="49411"/>
+                <a:alpha val="49019"/>
               </a:srgbClr>
             </a:outerShdw>
           </a:effectLst>
@@ -15389,7 +15389,7 @@
           <a:effectLst>
             <a:outerShdw blurRad="57150" rotWithShape="0" algn="bl" dir="5400000" dist="19050">
               <a:srgbClr val="000000">
-                <a:alpha val="49411"/>
+                <a:alpha val="49019"/>
               </a:srgbClr>
             </a:outerShdw>
           </a:effectLst>
@@ -15439,9 +15439,9 @@
           <p:nvPr/>
         </p:nvCxnSpPr>
         <p:spPr>
-          <a:xfrm>
-            <a:off x="2295438" y="6066650"/>
-            <a:ext cx="0" cy="1507800"/>
+          <a:xfrm flipH="1">
+            <a:off x="1358675" y="6882525"/>
+            <a:ext cx="1767300" cy="8700"/>
           </a:xfrm>
           <a:prstGeom prst="straightConnector1">
             <a:avLst/>
@@ -15466,7 +15466,7 @@
         </p:nvSpPr>
         <p:spPr>
           <a:xfrm>
-            <a:off x="993000" y="6954800"/>
+            <a:off x="4096913" y="7381700"/>
             <a:ext cx="2934000" cy="563700"/>
           </a:xfrm>
           <a:prstGeom prst="rect">
@@ -15555,7 +15555,7 @@
           <a:effectLst>
             <a:outerShdw blurRad="57150" rotWithShape="0" algn="bl" dir="5400000" dist="19050">
               <a:srgbClr val="000000">
-                <a:alpha val="49411"/>
+                <a:alpha val="49019"/>
               </a:srgbClr>
             </a:outerShdw>
           </a:effectLst>
@@ -15629,7 +15629,7 @@
           <a:effectLst>
             <a:outerShdw blurRad="57150" rotWithShape="0" algn="bl" dir="5400000" dist="19050">
               <a:srgbClr val="000000">
-                <a:alpha val="49411"/>
+                <a:alpha val="49019"/>
               </a:srgbClr>
             </a:outerShdw>
           </a:effectLst>
@@ -15703,7 +15703,7 @@
           <a:effectLst>
             <a:outerShdw blurRad="57150" rotWithShape="0" algn="bl" dir="5400000" dist="19050">
               <a:srgbClr val="000000">
-                <a:alpha val="49411"/>
+                <a:alpha val="49019"/>
               </a:srgbClr>
             </a:outerShdw>
           </a:effectLst>
@@ -15777,7 +15777,7 @@
           <a:effectLst>
             <a:outerShdw blurRad="57150" rotWithShape="0" algn="bl" dir="5400000" dist="19050">
               <a:srgbClr val="000000">
-                <a:alpha val="49411"/>
+                <a:alpha val="49019"/>
               </a:srgbClr>
             </a:outerShdw>
           </a:effectLst>
@@ -15851,7 +15851,7 @@
           <a:effectLst>
             <a:outerShdw blurRad="57150" rotWithShape="0" algn="bl" dir="5400000" dist="19050">
               <a:srgbClr val="000000">
-                <a:alpha val="49411"/>
+                <a:alpha val="49019"/>
               </a:srgbClr>
             </a:outerShdw>
           </a:effectLst>
@@ -15925,7 +15925,7 @@
           <a:effectLst>
             <a:outerShdw blurRad="57150" rotWithShape="0" algn="bl" dir="5400000" dist="19050">
               <a:srgbClr val="000000">
-                <a:alpha val="49411"/>
+                <a:alpha val="49019"/>
               </a:srgbClr>
             </a:outerShdw>
           </a:effectLst>
@@ -15999,7 +15999,7 @@
           <a:effectLst>
             <a:outerShdw blurRad="57150" rotWithShape="0" algn="bl" dir="5400000" dist="19050">
               <a:srgbClr val="000000">
-                <a:alpha val="49411"/>
+                <a:alpha val="49019"/>
               </a:srgbClr>
             </a:outerShdw>
           </a:effectLst>
@@ -16073,7 +16073,7 @@
           <a:effectLst>
             <a:outerShdw blurRad="57150" rotWithShape="0" algn="bl" dir="5400000" dist="19050">
               <a:srgbClr val="000000">
-                <a:alpha val="49411"/>
+                <a:alpha val="49019"/>
               </a:srgbClr>
             </a:outerShdw>
           </a:effectLst>
@@ -16147,7 +16147,7 @@
           <a:effectLst>
             <a:outerShdw blurRad="57150" rotWithShape="0" algn="bl" dir="5400000" dist="19050">
               <a:srgbClr val="000000">
-                <a:alpha val="49411"/>
+                <a:alpha val="49019"/>
               </a:srgbClr>
             </a:outerShdw>
           </a:effectLst>
@@ -16221,7 +16221,7 @@
           <a:effectLst>
             <a:outerShdw blurRad="57150" rotWithShape="0" algn="bl" dir="5400000" dist="19050">
               <a:srgbClr val="000000">
-                <a:alpha val="49411"/>
+                <a:alpha val="49019"/>
               </a:srgbClr>
             </a:outerShdw>
           </a:effectLst>
@@ -16295,7 +16295,7 @@
           <a:effectLst>
             <a:outerShdw blurRad="57150" rotWithShape="0" algn="bl" dir="5400000" dist="19050">
               <a:srgbClr val="000000">
-                <a:alpha val="49411"/>
+                <a:alpha val="49019"/>
               </a:srgbClr>
             </a:outerShdw>
           </a:effectLst>
@@ -16369,7 +16369,7 @@
           <a:effectLst>
             <a:outerShdw blurRad="57150" rotWithShape="0" algn="bl" dir="5400000" dist="19050">
               <a:srgbClr val="000000">
-                <a:alpha val="49411"/>
+                <a:alpha val="49019"/>
               </a:srgbClr>
             </a:outerShdw>
           </a:effectLst>
@@ -16443,7 +16443,7 @@
           <a:effectLst>
             <a:outerShdw blurRad="57150" rotWithShape="0" algn="bl" dir="5400000" dist="19050">
               <a:srgbClr val="000000">
-                <a:alpha val="49411"/>
+                <a:alpha val="49019"/>
               </a:srgbClr>
             </a:outerShdw>
           </a:effectLst>
@@ -16832,7 +16832,7 @@
           <a:effectLst>
             <a:outerShdw blurRad="57150" rotWithShape="0" algn="bl" dir="5400000" dist="19050">
               <a:srgbClr val="000000">
-                <a:alpha val="49411"/>
+                <a:alpha val="49019"/>
               </a:srgbClr>
             </a:outerShdw>
           </a:effectLst>
@@ -16906,7 +16906,7 @@
           <a:effectLst>
             <a:outerShdw blurRad="57150" rotWithShape="0" algn="bl" dir="5400000" dist="19050">
               <a:srgbClr val="000000">
-                <a:alpha val="49411"/>
+                <a:alpha val="49019"/>
               </a:srgbClr>
             </a:outerShdw>
           </a:effectLst>
@@ -16980,7 +16980,7 @@
           <a:effectLst>
             <a:outerShdw blurRad="57150" rotWithShape="0" algn="bl" dir="5400000" dist="19050">
               <a:srgbClr val="000000">
-                <a:alpha val="49411"/>
+                <a:alpha val="49019"/>
               </a:srgbClr>
             </a:outerShdw>
           </a:effectLst>
@@ -17054,7 +17054,7 @@
           <a:effectLst>
             <a:outerShdw blurRad="57150" rotWithShape="0" algn="bl" dir="5400000" dist="19050">
               <a:srgbClr val="000000">
-                <a:alpha val="49411"/>
+                <a:alpha val="49019"/>
               </a:srgbClr>
             </a:outerShdw>
           </a:effectLst>
@@ -17128,7 +17128,7 @@
           <a:effectLst>
             <a:outerShdw blurRad="57150" rotWithShape="0" algn="bl" dir="5400000" dist="19050">
               <a:srgbClr val="000000">
-                <a:alpha val="49411"/>
+                <a:alpha val="49019"/>
               </a:srgbClr>
             </a:outerShdw>
           </a:effectLst>
@@ -17202,7 +17202,7 @@
           <a:effectLst>
             <a:outerShdw blurRad="57150" rotWithShape="0" algn="bl" dir="5400000" dist="19050">
               <a:srgbClr val="000000">
-                <a:alpha val="49411"/>
+                <a:alpha val="49019"/>
               </a:srgbClr>
             </a:outerShdw>
           </a:effectLst>
@@ -17276,7 +17276,7 @@
           <a:effectLst>
             <a:outerShdw blurRad="57150" rotWithShape="0" algn="bl" dir="5400000" dist="19050">
               <a:srgbClr val="000000">
-                <a:alpha val="49411"/>
+                <a:alpha val="49019"/>
               </a:srgbClr>
             </a:outerShdw>
           </a:effectLst>
@@ -17350,7 +17350,7 @@
           <a:effectLst>
             <a:outerShdw blurRad="57150" rotWithShape="0" algn="bl" dir="5400000" dist="19050">
               <a:srgbClr val="000000">
-                <a:alpha val="49411"/>
+                <a:alpha val="49019"/>
               </a:srgbClr>
             </a:outerShdw>
           </a:effectLst>
@@ -17424,7 +17424,7 @@
           <a:effectLst>
             <a:outerShdw blurRad="57150" rotWithShape="0" algn="bl" dir="5400000" dist="19050">
               <a:srgbClr val="000000">
-                <a:alpha val="49411"/>
+                <a:alpha val="49019"/>
               </a:srgbClr>
             </a:outerShdw>
           </a:effectLst>
@@ -17498,7 +17498,7 @@
           <a:effectLst>
             <a:outerShdw blurRad="57150" rotWithShape="0" algn="bl" dir="5400000" dist="19050">
               <a:srgbClr val="000000">
-                <a:alpha val="49411"/>
+                <a:alpha val="49019"/>
               </a:srgbClr>
             </a:outerShdw>
           </a:effectLst>
@@ -17572,7 +17572,7 @@
           <a:effectLst>
             <a:outerShdw blurRad="57150" rotWithShape="0" algn="bl" dir="5400000" dist="19050">
               <a:srgbClr val="000000">
-                <a:alpha val="49411"/>
+                <a:alpha val="49019"/>
               </a:srgbClr>
             </a:outerShdw>
           </a:effectLst>
@@ -17646,7 +17646,7 @@
           <a:effectLst>
             <a:outerShdw blurRad="57150" rotWithShape="0" algn="bl" dir="5400000" dist="19050">
               <a:srgbClr val="000000">
-                <a:alpha val="49411"/>
+                <a:alpha val="49019"/>
               </a:srgbClr>
             </a:outerShdw>
           </a:effectLst>
@@ -17720,7 +17720,7 @@
           <a:effectLst>
             <a:outerShdw blurRad="57150" rotWithShape="0" algn="bl" dir="5400000" dist="19050">
               <a:srgbClr val="000000">
-                <a:alpha val="49411"/>
+                <a:alpha val="49019"/>
               </a:srgbClr>
             </a:outerShdw>
           </a:effectLst>
@@ -17794,7 +17794,7 @@
           <a:effectLst>
             <a:outerShdw blurRad="57150" rotWithShape="0" algn="bl" dir="5400000" dist="19050">
               <a:srgbClr val="000000">
-                <a:alpha val="49411"/>
+                <a:alpha val="49019"/>
               </a:srgbClr>
             </a:outerShdw>
           </a:effectLst>
@@ -17868,7 +17868,7 @@
           <a:effectLst>
             <a:outerShdw blurRad="57150" rotWithShape="0" algn="bl" dir="5400000" dist="19050">
               <a:srgbClr val="000000">
-                <a:alpha val="49411"/>
+                <a:alpha val="49019"/>
               </a:srgbClr>
             </a:outerShdw>
           </a:effectLst>
@@ -17942,7 +17942,7 @@
           <a:effectLst>
             <a:outerShdw blurRad="57150" rotWithShape="0" algn="bl" dir="5400000" dist="19050">
               <a:srgbClr val="000000">
-                <a:alpha val="49411"/>
+                <a:alpha val="49019"/>
               </a:srgbClr>
             </a:outerShdw>
           </a:effectLst>
@@ -18016,7 +18016,7 @@
           <a:effectLst>
             <a:outerShdw blurRad="57150" rotWithShape="0" algn="bl" dir="5400000" dist="19050">
               <a:srgbClr val="000000">
-                <a:alpha val="49411"/>
+                <a:alpha val="49019"/>
               </a:srgbClr>
             </a:outerShdw>
           </a:effectLst>
@@ -18090,7 +18090,7 @@
           <a:effectLst>
             <a:outerShdw blurRad="57150" rotWithShape="0" algn="bl" dir="5400000" dist="19050">
               <a:srgbClr val="000000">
-                <a:alpha val="49411"/>
+                <a:alpha val="49019"/>
               </a:srgbClr>
             </a:outerShdw>
           </a:effectLst>
@@ -18164,7 +18164,7 @@
           <a:effectLst>
             <a:outerShdw blurRad="57150" rotWithShape="0" algn="bl" dir="5400000" dist="19050">
               <a:srgbClr val="000000">
-                <a:alpha val="49411"/>
+                <a:alpha val="49019"/>
               </a:srgbClr>
             </a:outerShdw>
           </a:effectLst>
@@ -18238,7 +18238,7 @@
           <a:effectLst>
             <a:outerShdw blurRad="57150" rotWithShape="0" algn="bl" dir="5400000" dist="19050">
               <a:srgbClr val="000000">
-                <a:alpha val="49411"/>
+                <a:alpha val="49019"/>
               </a:srgbClr>
             </a:outerShdw>
           </a:effectLst>
@@ -18312,7 +18312,7 @@
           <a:effectLst>
             <a:outerShdw blurRad="57150" rotWithShape="0" algn="bl" dir="5400000" dist="19050">
               <a:srgbClr val="000000">
-                <a:alpha val="49411"/>
+                <a:alpha val="49019"/>
               </a:srgbClr>
             </a:outerShdw>
           </a:effectLst>
@@ -18386,7 +18386,7 @@
           <a:effectLst>
             <a:outerShdw blurRad="57150" rotWithShape="0" algn="bl" dir="5400000" dist="19050">
               <a:srgbClr val="000000">
-                <a:alpha val="49411"/>
+                <a:alpha val="49019"/>
               </a:srgbClr>
             </a:outerShdw>
           </a:effectLst>
@@ -18460,7 +18460,7 @@
           <a:effectLst>
             <a:outerShdw blurRad="57150" rotWithShape="0" algn="bl" dir="5400000" dist="19050">
               <a:srgbClr val="000000">
-                <a:alpha val="49411"/>
+                <a:alpha val="49019"/>
               </a:srgbClr>
             </a:outerShdw>
           </a:effectLst>
@@ -18534,7 +18534,7 @@
           <a:effectLst>
             <a:outerShdw blurRad="57150" rotWithShape="0" algn="bl" dir="5400000" dist="19050">
               <a:srgbClr val="000000">
-                <a:alpha val="49411"/>
+                <a:alpha val="49019"/>
               </a:srgbClr>
             </a:outerShdw>
           </a:effectLst>
@@ -18608,7 +18608,7 @@
           <a:effectLst>
             <a:outerShdw blurRad="57150" rotWithShape="0" algn="bl" dir="5400000" dist="19050">
               <a:srgbClr val="000000">
-                <a:alpha val="49411"/>
+                <a:alpha val="49019"/>
               </a:srgbClr>
             </a:outerShdw>
           </a:effectLst>
@@ -18682,7 +18682,7 @@
           <a:effectLst>
             <a:outerShdw blurRad="57150" rotWithShape="0" algn="bl" dir="5400000" dist="19050">
               <a:srgbClr val="000000">
-                <a:alpha val="49411"/>
+                <a:alpha val="49019"/>
               </a:srgbClr>
             </a:outerShdw>
           </a:effectLst>
@@ -18756,7 +18756,7 @@
           <a:effectLst>
             <a:outerShdw blurRad="57150" rotWithShape="0" algn="bl" dir="5400000" dist="19050">
               <a:srgbClr val="000000">
-                <a:alpha val="49411"/>
+                <a:alpha val="49019"/>
               </a:srgbClr>
             </a:outerShdw>
           </a:effectLst>

</xml_diff>